<commit_message>
getting ready for the sessions
</commit_message>
<xml_diff>
--- a/Andela LevelUp Introduction.pptx
+++ b/Andela LevelUp Introduction.pptx
@@ -2,7 +2,7 @@
 <file path=ppt/presentation.xml><?xml version="1.0" encoding="utf-8"?>
 <p:presentation xmlns:a="http://schemas.openxmlformats.org/drawingml/2006/main" xmlns:r="http://schemas.openxmlformats.org/officeDocument/2006/relationships" xmlns:p="http://schemas.openxmlformats.org/presentationml/2006/main" saveSubsetFonts="1">
   <p:sldMasterIdLst>
-    <p:sldMasterId id="2147483648" r:id="rId1"/>
+    <p:sldMasterId id="2147483959" r:id="rId1"/>
   </p:sldMasterIdLst>
   <p:sldIdLst>
     <p:sldId id="256" r:id="rId2"/>
@@ -10,6 +10,9 @@
     <p:sldId id="258" r:id="rId4"/>
     <p:sldId id="259" r:id="rId5"/>
     <p:sldId id="260" r:id="rId6"/>
+    <p:sldId id="261" r:id="rId7"/>
+    <p:sldId id="263" r:id="rId8"/>
+    <p:sldId id="262" r:id="rId9"/>
   </p:sldIdLst>
   <p:sldSz cx="12192000" cy="6858000"/>
   <p:notesSz cx="6858000" cy="9144000"/>
@@ -17,7 +20,7 @@
     <a:defPPr>
       <a:defRPr lang="en-US"/>
     </a:defPPr>
-    <a:lvl1pPr marL="0" algn="l" defTabSz="914400" rtl="0" eaLnBrk="1" latinLnBrk="0" hangingPunct="1">
+    <a:lvl1pPr marL="0" algn="l" defTabSz="457200" rtl="0" eaLnBrk="1" latinLnBrk="0" hangingPunct="1">
       <a:defRPr sz="1800" kern="1200">
         <a:solidFill>
           <a:schemeClr val="tx1"/>
@@ -27,7 +30,7 @@
         <a:cs typeface="+mn-cs"/>
       </a:defRPr>
     </a:lvl1pPr>
-    <a:lvl2pPr marL="457200" algn="l" defTabSz="914400" rtl="0" eaLnBrk="1" latinLnBrk="0" hangingPunct="1">
+    <a:lvl2pPr marL="457200" algn="l" defTabSz="457200" rtl="0" eaLnBrk="1" latinLnBrk="0" hangingPunct="1">
       <a:defRPr sz="1800" kern="1200">
         <a:solidFill>
           <a:schemeClr val="tx1"/>
@@ -37,7 +40,7 @@
         <a:cs typeface="+mn-cs"/>
       </a:defRPr>
     </a:lvl2pPr>
-    <a:lvl3pPr marL="914400" algn="l" defTabSz="914400" rtl="0" eaLnBrk="1" latinLnBrk="0" hangingPunct="1">
+    <a:lvl3pPr marL="914400" algn="l" defTabSz="457200" rtl="0" eaLnBrk="1" latinLnBrk="0" hangingPunct="1">
       <a:defRPr sz="1800" kern="1200">
         <a:solidFill>
           <a:schemeClr val="tx1"/>
@@ -47,7 +50,7 @@
         <a:cs typeface="+mn-cs"/>
       </a:defRPr>
     </a:lvl3pPr>
-    <a:lvl4pPr marL="1371600" algn="l" defTabSz="914400" rtl="0" eaLnBrk="1" latinLnBrk="0" hangingPunct="1">
+    <a:lvl4pPr marL="1371600" algn="l" defTabSz="457200" rtl="0" eaLnBrk="1" latinLnBrk="0" hangingPunct="1">
       <a:defRPr sz="1800" kern="1200">
         <a:solidFill>
           <a:schemeClr val="tx1"/>
@@ -57,7 +60,7 @@
         <a:cs typeface="+mn-cs"/>
       </a:defRPr>
     </a:lvl4pPr>
-    <a:lvl5pPr marL="1828800" algn="l" defTabSz="914400" rtl="0" eaLnBrk="1" latinLnBrk="0" hangingPunct="1">
+    <a:lvl5pPr marL="1828800" algn="l" defTabSz="457200" rtl="0" eaLnBrk="1" latinLnBrk="0" hangingPunct="1">
       <a:defRPr sz="1800" kern="1200">
         <a:solidFill>
           <a:schemeClr val="tx1"/>
@@ -67,7 +70,7 @@
         <a:cs typeface="+mn-cs"/>
       </a:defRPr>
     </a:lvl5pPr>
-    <a:lvl6pPr marL="2286000" algn="l" defTabSz="914400" rtl="0" eaLnBrk="1" latinLnBrk="0" hangingPunct="1">
+    <a:lvl6pPr marL="2286000" algn="l" defTabSz="457200" rtl="0" eaLnBrk="1" latinLnBrk="0" hangingPunct="1">
       <a:defRPr sz="1800" kern="1200">
         <a:solidFill>
           <a:schemeClr val="tx1"/>
@@ -77,7 +80,7 @@
         <a:cs typeface="+mn-cs"/>
       </a:defRPr>
     </a:lvl6pPr>
-    <a:lvl7pPr marL="2743200" algn="l" defTabSz="914400" rtl="0" eaLnBrk="1" latinLnBrk="0" hangingPunct="1">
+    <a:lvl7pPr marL="2743200" algn="l" defTabSz="457200" rtl="0" eaLnBrk="1" latinLnBrk="0" hangingPunct="1">
       <a:defRPr sz="1800" kern="1200">
         <a:solidFill>
           <a:schemeClr val="tx1"/>
@@ -87,7 +90,7 @@
         <a:cs typeface="+mn-cs"/>
       </a:defRPr>
     </a:lvl7pPr>
-    <a:lvl8pPr marL="3200400" algn="l" defTabSz="914400" rtl="0" eaLnBrk="1" latinLnBrk="0" hangingPunct="1">
+    <a:lvl8pPr marL="3200400" algn="l" defTabSz="457200" rtl="0" eaLnBrk="1" latinLnBrk="0" hangingPunct="1">
       <a:defRPr sz="1800" kern="1200">
         <a:solidFill>
           <a:schemeClr val="tx1"/>
@@ -97,7 +100,7 @@
         <a:cs typeface="+mn-cs"/>
       </a:defRPr>
     </a:lvl8pPr>
-    <a:lvl9pPr marL="3657600" algn="l" defTabSz="914400" rtl="0" eaLnBrk="1" latinLnBrk="0" hangingPunct="1">
+    <a:lvl9pPr marL="3657600" algn="l" defTabSz="457200" rtl="0" eaLnBrk="1" latinLnBrk="0" hangingPunct="1">
       <a:defRPr sz="1800" kern="1200">
         <a:solidFill>
           <a:schemeClr val="tx1"/>
@@ -108,12 +111,27 @@
       </a:defRPr>
     </a:lvl9pPr>
   </p:defaultTextStyle>
+  <p:extLst>
+    <p:ext uri="{EFAFB233-063F-42B5-8137-9DF3F51BA10A}">
+      <p15:sldGuideLst xmlns:p15="http://schemas.microsoft.com/office/powerpoint/2012/main"/>
+    </p:ext>
+  </p:extLst>
 </p:presentation>
 </file>
 
 <file path=ppt/slideLayouts/slideLayout1.xml><?xml version="1.0" encoding="utf-8"?>
-<p:sldLayout xmlns:a="http://schemas.openxmlformats.org/drawingml/2006/main" xmlns:r="http://schemas.openxmlformats.org/officeDocument/2006/relationships" xmlns:p="http://schemas.openxmlformats.org/presentationml/2006/main" type="title" preserve="1">
+<p:sldLayout xmlns:a="http://schemas.openxmlformats.org/drawingml/2006/main" xmlns:r="http://schemas.openxmlformats.org/officeDocument/2006/relationships" xmlns:p="http://schemas.openxmlformats.org/presentationml/2006/main" showMasterSp="0" type="title" preserve="1">
   <p:cSld name="Title Slide">
+    <p:bg>
+      <p:bgPr>
+        <a:solidFill>
+          <a:schemeClr val="bg2">
+            <a:lumMod val="75000"/>
+          </a:schemeClr>
+        </a:solidFill>
+        <a:effectLst/>
+      </p:bgPr>
+    </p:bg>
     <p:spTree>
       <p:nvGrpSpPr>
         <p:cNvPr id="1" name=""/>
@@ -130,13 +148,7 @@
       </p:grpSpPr>
       <p:sp>
         <p:nvSpPr>
-          <p:cNvPr id="2" name="Title 1">
-            <a:extLst>
-              <a:ext uri="{FF2B5EF4-FFF2-40B4-BE49-F238E27FC236}">
-                <a16:creationId xmlns:a16="http://schemas.microsoft.com/office/drawing/2014/main" id="{726A55D6-7C8E-4202-B534-1B2B834463FB}"/>
-              </a:ext>
-            </a:extLst>
-          </p:cNvPr>
+          <p:cNvPr id="2" name="Title 1"/>
           <p:cNvSpPr>
             <a:spLocks noGrp="1"/>
           </p:cNvSpPr>
@@ -146,15 +158,24 @@
         </p:nvSpPr>
         <p:spPr>
           <a:xfrm>
-            <a:off x="1524000" y="1122363"/>
-            <a:ext cx="9144000" cy="2387600"/>
+            <a:off x="1261872" y="758952"/>
+            <a:ext cx="9418320" cy="4041648"/>
           </a:xfrm>
         </p:spPr>
         <p:txBody>
-          <a:bodyPr anchor="b"/>
+          <a:bodyPr anchor="b">
+            <a:normAutofit/>
+          </a:bodyPr>
           <a:lstStyle>
-            <a:lvl1pPr algn="ctr">
-              <a:defRPr sz="6000"/>
+            <a:lvl1pPr algn="l">
+              <a:lnSpc>
+                <a:spcPct val="85000"/>
+              </a:lnSpc>
+              <a:defRPr sz="7200" baseline="0">
+                <a:solidFill>
+                  <a:schemeClr val="tx1"/>
+                </a:solidFill>
+              </a:defRPr>
             </a:lvl1pPr>
           </a:lstStyle>
           <a:p>
@@ -162,18 +183,13 @@
               <a:rPr lang="en-US"/>
               <a:t>Click to edit Master title style</a:t>
             </a:r>
-          </a:p>
-        </p:txBody>
-      </p:sp>
-      <p:sp>
-        <p:nvSpPr>
-          <p:cNvPr id="3" name="Subtitle 2">
-            <a:extLst>
-              <a:ext uri="{FF2B5EF4-FFF2-40B4-BE49-F238E27FC236}">
-                <a16:creationId xmlns:a16="http://schemas.microsoft.com/office/drawing/2014/main" id="{E61E9366-C5B2-4FD7-81F9-D51808BC6A13}"/>
-              </a:ext>
-            </a:extLst>
-          </p:cNvPr>
+            <a:endParaRPr lang="en-US" dirty="0"/>
+          </a:p>
+        </p:txBody>
+      </p:sp>
+      <p:sp>
+        <p:nvSpPr>
+          <p:cNvPr id="3" name="Subtitle 2"/>
           <p:cNvSpPr>
             <a:spLocks noGrp="1"/>
           </p:cNvSpPr>
@@ -183,48 +199,56 @@
         </p:nvSpPr>
         <p:spPr>
           <a:xfrm>
-            <a:off x="1524000" y="3602038"/>
-            <a:ext cx="9144000" cy="1655762"/>
+            <a:off x="1261872" y="4800600"/>
+            <a:ext cx="9418320" cy="1691640"/>
           </a:xfrm>
         </p:spPr>
         <p:txBody>
-          <a:bodyPr/>
+          <a:bodyPr>
+            <a:normAutofit/>
+          </a:bodyPr>
           <a:lstStyle>
-            <a:lvl1pPr marL="0" indent="0" algn="ctr">
-              <a:buNone/>
-              <a:defRPr sz="2400"/>
+            <a:lvl1pPr marL="0" indent="0" algn="l">
+              <a:buNone/>
+              <a:defRPr sz="2200" baseline="0">
+                <a:solidFill>
+                  <a:schemeClr val="tx1">
+                    <a:lumMod val="75000"/>
+                  </a:schemeClr>
+                </a:solidFill>
+              </a:defRPr>
             </a:lvl1pPr>
             <a:lvl2pPr marL="457200" indent="0" algn="ctr">
               <a:buNone/>
-              <a:defRPr sz="2000"/>
+              <a:defRPr sz="2200"/>
             </a:lvl2pPr>
             <a:lvl3pPr marL="914400" indent="0" algn="ctr">
               <a:buNone/>
-              <a:defRPr sz="1800"/>
+              <a:defRPr sz="2200"/>
             </a:lvl3pPr>
             <a:lvl4pPr marL="1371600" indent="0" algn="ctr">
               <a:buNone/>
-              <a:defRPr sz="1600"/>
+              <a:defRPr sz="2000"/>
             </a:lvl4pPr>
             <a:lvl5pPr marL="1828800" indent="0" algn="ctr">
               <a:buNone/>
-              <a:defRPr sz="1600"/>
+              <a:defRPr sz="2000"/>
             </a:lvl5pPr>
             <a:lvl6pPr marL="2286000" indent="0" algn="ctr">
               <a:buNone/>
-              <a:defRPr sz="1600"/>
+              <a:defRPr sz="2000"/>
             </a:lvl6pPr>
             <a:lvl7pPr marL="2743200" indent="0" algn="ctr">
               <a:buNone/>
-              <a:defRPr sz="1600"/>
+              <a:defRPr sz="2000"/>
             </a:lvl7pPr>
             <a:lvl8pPr marL="3200400" indent="0" algn="ctr">
               <a:buNone/>
-              <a:defRPr sz="1600"/>
+              <a:defRPr sz="2000"/>
             </a:lvl8pPr>
             <a:lvl9pPr marL="3657600" indent="0" algn="ctr">
               <a:buNone/>
-              <a:defRPr sz="1600"/>
+              <a:defRPr sz="2000"/>
             </a:lvl9pPr>
           </a:lstStyle>
           <a:p>
@@ -232,18 +256,13 @@
               <a:rPr lang="en-US"/>
               <a:t>Click to edit Master subtitle style</a:t>
             </a:r>
-          </a:p>
-        </p:txBody>
-      </p:sp>
-      <p:sp>
-        <p:nvSpPr>
-          <p:cNvPr id="4" name="Date Placeholder 3">
-            <a:extLst>
-              <a:ext uri="{FF2B5EF4-FFF2-40B4-BE49-F238E27FC236}">
-                <a16:creationId xmlns:a16="http://schemas.microsoft.com/office/drawing/2014/main" id="{15C8E35D-5732-4276-9F2F-69A28E983115}"/>
-              </a:ext>
-            </a:extLst>
-          </p:cNvPr>
+            <a:endParaRPr lang="en-US" dirty="0"/>
+          </a:p>
+        </p:txBody>
+      </p:sp>
+      <p:sp>
+        <p:nvSpPr>
+          <p:cNvPr id="4" name="Date Placeholder 3"/>
           <p:cNvSpPr>
             <a:spLocks noGrp="1"/>
           </p:cNvSpPr>
@@ -254,11 +273,21 @@
         <p:spPr/>
         <p:txBody>
           <a:bodyPr/>
-          <a:lstStyle/>
+          <a:lstStyle>
+            <a:lvl1pPr>
+              <a:defRPr>
+                <a:solidFill>
+                  <a:schemeClr val="tx1">
+                    <a:lumMod val="50000"/>
+                  </a:schemeClr>
+                </a:solidFill>
+              </a:defRPr>
+            </a:lvl1pPr>
+          </a:lstStyle>
           <a:p>
             <a:fld id="{471BB4B2-9036-4B80-8BF0-13DB295CF368}" type="datetimeFigureOut">
               <a:rPr lang="en-US" smtClean="0"/>
-              <a:t>2/26/2018</a:t>
+              <a:t>4/9/2018</a:t>
             </a:fld>
             <a:endParaRPr lang="en-US"/>
           </a:p>
@@ -266,13 +295,7 @@
       </p:sp>
       <p:sp>
         <p:nvSpPr>
-          <p:cNvPr id="5" name="Footer Placeholder 4">
-            <a:extLst>
-              <a:ext uri="{FF2B5EF4-FFF2-40B4-BE49-F238E27FC236}">
-                <a16:creationId xmlns:a16="http://schemas.microsoft.com/office/drawing/2014/main" id="{188EDB85-207B-4895-9601-ED023D0CC23D}"/>
-              </a:ext>
-            </a:extLst>
-          </p:cNvPr>
+          <p:cNvPr id="5" name="Footer Placeholder 4"/>
           <p:cNvSpPr>
             <a:spLocks noGrp="1"/>
           </p:cNvSpPr>
@@ -283,7 +306,17 @@
         <p:spPr/>
         <p:txBody>
           <a:bodyPr/>
-          <a:lstStyle/>
+          <a:lstStyle>
+            <a:lvl1pPr>
+              <a:defRPr>
+                <a:solidFill>
+                  <a:schemeClr val="tx1">
+                    <a:lumMod val="65000"/>
+                  </a:schemeClr>
+                </a:solidFill>
+              </a:defRPr>
+            </a:lvl1pPr>
+          </a:lstStyle>
           <a:p>
             <a:endParaRPr lang="en-US"/>
           </a:p>
@@ -291,13 +324,7 @@
       </p:sp>
       <p:sp>
         <p:nvSpPr>
-          <p:cNvPr id="6" name="Slide Number Placeholder 5">
-            <a:extLst>
-              <a:ext uri="{FF2B5EF4-FFF2-40B4-BE49-F238E27FC236}">
-                <a16:creationId xmlns:a16="http://schemas.microsoft.com/office/drawing/2014/main" id="{C9D4F166-C144-4E7C-9C85-770801070564}"/>
-              </a:ext>
-            </a:extLst>
-          </p:cNvPr>
+          <p:cNvPr id="6" name="Slide Number Placeholder 5"/>
           <p:cNvSpPr>
             <a:spLocks noGrp="1"/>
           </p:cNvSpPr>
@@ -308,7 +335,17 @@
         <p:spPr/>
         <p:txBody>
           <a:bodyPr/>
-          <a:lstStyle/>
+          <a:lstStyle>
+            <a:lvl1pPr>
+              <a:defRPr>
+                <a:solidFill>
+                  <a:schemeClr val="tx1">
+                    <a:lumMod val="65000"/>
+                  </a:schemeClr>
+                </a:solidFill>
+              </a:defRPr>
+            </a:lvl1pPr>
+          </a:lstStyle>
           <a:p>
             <a:fld id="{E743E753-E74F-47E1-9F58-8985AC9A518F}" type="slidenum">
               <a:rPr lang="en-US" smtClean="0"/>
@@ -318,16 +355,59 @@
           </a:p>
         </p:txBody>
       </p:sp>
+      <p:sp>
+        <p:nvSpPr>
+          <p:cNvPr id="7" name="Rectangle 6"/>
+          <p:cNvSpPr/>
+          <p:nvPr/>
+        </p:nvSpPr>
+        <p:spPr>
+          <a:xfrm>
+            <a:off x="0" y="0"/>
+            <a:ext cx="457200" cy="6858000"/>
+          </a:xfrm>
+          <a:prstGeom prst="rect">
+            <a:avLst/>
+          </a:prstGeom>
+          <a:solidFill>
+            <a:schemeClr val="accent1"/>
+          </a:solidFill>
+          <a:ln>
+            <a:noFill/>
+          </a:ln>
+        </p:spPr>
+        <p:style>
+          <a:lnRef idx="2">
+            <a:schemeClr val="accent1">
+              <a:shade val="50000"/>
+            </a:schemeClr>
+          </a:lnRef>
+          <a:fillRef idx="1">
+            <a:schemeClr val="accent1"/>
+          </a:fillRef>
+          <a:effectRef idx="0">
+            <a:schemeClr val="accent1"/>
+          </a:effectRef>
+          <a:fontRef idx="minor">
+            <a:schemeClr val="lt1"/>
+          </a:fontRef>
+        </p:style>
+      </p:sp>
     </p:spTree>
     <p:extLst>
       <p:ext uri="{BB962C8B-B14F-4D97-AF65-F5344CB8AC3E}">
-        <p14:creationId xmlns:p14="http://schemas.microsoft.com/office/powerpoint/2010/main" val="69592621"/>
+        <p14:creationId xmlns:p14="http://schemas.microsoft.com/office/powerpoint/2010/main" val="192882610"/>
       </p:ext>
     </p:extLst>
   </p:cSld>
   <p:clrMapOvr>
-    <a:masterClrMapping/>
+    <a:overrideClrMapping bg1="dk1" tx1="lt1" bg2="dk2" tx2="lt2" accent1="accent1" accent2="accent2" accent3="accent3" accent4="accent4" accent5="accent5" accent6="accent6" hlink="hlink" folHlink="folHlink"/>
   </p:clrMapOvr>
+  <p:extLst>
+    <p:ext uri="{DCECCB84-F9BA-43D5-87BE-67443E8EF086}">
+      <p15:sldGuideLst xmlns:p15="http://schemas.microsoft.com/office/powerpoint/2012/main"/>
+    </p:ext>
+  </p:extLst>
 </p:sldLayout>
 </file>
 
@@ -350,13 +430,7 @@
       </p:grpSpPr>
       <p:sp>
         <p:nvSpPr>
-          <p:cNvPr id="2" name="Title 1">
-            <a:extLst>
-              <a:ext uri="{FF2B5EF4-FFF2-40B4-BE49-F238E27FC236}">
-                <a16:creationId xmlns:a16="http://schemas.microsoft.com/office/drawing/2014/main" id="{35A8A295-FAD8-4ACD-97AC-94730A8431AE}"/>
-              </a:ext>
-            </a:extLst>
-          </p:cNvPr>
+          <p:cNvPr id="2" name="Title 1"/>
           <p:cNvSpPr>
             <a:spLocks noGrp="1"/>
           </p:cNvSpPr>
@@ -373,18 +447,13 @@
               <a:rPr lang="en-US"/>
               <a:t>Click to edit Master title style</a:t>
             </a:r>
-          </a:p>
-        </p:txBody>
-      </p:sp>
-      <p:sp>
-        <p:nvSpPr>
-          <p:cNvPr id="3" name="Vertical Text Placeholder 2">
-            <a:extLst>
-              <a:ext uri="{FF2B5EF4-FFF2-40B4-BE49-F238E27FC236}">
-                <a16:creationId xmlns:a16="http://schemas.microsoft.com/office/drawing/2014/main" id="{F8A6CED1-77A6-407E-AC3C-3D49A98C6F07}"/>
-              </a:ext>
-            </a:extLst>
-          </p:cNvPr>
+            <a:endParaRPr lang="en-US" dirty="0"/>
+          </a:p>
+        </p:txBody>
+      </p:sp>
+      <p:sp>
+        <p:nvSpPr>
+          <p:cNvPr id="3" name="Vertical Text Placeholder 2"/>
           <p:cNvSpPr>
             <a:spLocks noGrp="1"/>
           </p:cNvSpPr>
@@ -430,18 +499,13 @@
               <a:rPr lang="en-US"/>
               <a:t>Fifth level</a:t>
             </a:r>
-          </a:p>
-        </p:txBody>
-      </p:sp>
-      <p:sp>
-        <p:nvSpPr>
-          <p:cNvPr id="4" name="Date Placeholder 3">
-            <a:extLst>
-              <a:ext uri="{FF2B5EF4-FFF2-40B4-BE49-F238E27FC236}">
-                <a16:creationId xmlns:a16="http://schemas.microsoft.com/office/drawing/2014/main" id="{7E2A514A-C488-410B-8740-DFA8BA571E37}"/>
-              </a:ext>
-            </a:extLst>
-          </p:cNvPr>
+            <a:endParaRPr lang="en-US" dirty="0"/>
+          </a:p>
+        </p:txBody>
+      </p:sp>
+      <p:sp>
+        <p:nvSpPr>
+          <p:cNvPr id="4" name="Date Placeholder 3"/>
           <p:cNvSpPr>
             <a:spLocks noGrp="1"/>
           </p:cNvSpPr>
@@ -456,7 +520,7 @@
           <a:p>
             <a:fld id="{471BB4B2-9036-4B80-8BF0-13DB295CF368}" type="datetimeFigureOut">
               <a:rPr lang="en-US" smtClean="0"/>
-              <a:t>2/26/2018</a:t>
+              <a:t>4/9/2018</a:t>
             </a:fld>
             <a:endParaRPr lang="en-US"/>
           </a:p>
@@ -464,13 +528,7 @@
       </p:sp>
       <p:sp>
         <p:nvSpPr>
-          <p:cNvPr id="5" name="Footer Placeholder 4">
-            <a:extLst>
-              <a:ext uri="{FF2B5EF4-FFF2-40B4-BE49-F238E27FC236}">
-                <a16:creationId xmlns:a16="http://schemas.microsoft.com/office/drawing/2014/main" id="{2DFDE81B-9057-4EBA-8E6B-3107479CFDB1}"/>
-              </a:ext>
-            </a:extLst>
-          </p:cNvPr>
+          <p:cNvPr id="5" name="Footer Placeholder 4"/>
           <p:cNvSpPr>
             <a:spLocks noGrp="1"/>
           </p:cNvSpPr>
@@ -489,13 +547,7 @@
       </p:sp>
       <p:sp>
         <p:nvSpPr>
-          <p:cNvPr id="6" name="Slide Number Placeholder 5">
-            <a:extLst>
-              <a:ext uri="{FF2B5EF4-FFF2-40B4-BE49-F238E27FC236}">
-                <a16:creationId xmlns:a16="http://schemas.microsoft.com/office/drawing/2014/main" id="{BA02D3EE-1669-4ED4-ADB3-93E6E08ED0AB}"/>
-              </a:ext>
-            </a:extLst>
-          </p:cNvPr>
+          <p:cNvPr id="6" name="Slide Number Placeholder 5"/>
           <p:cNvSpPr>
             <a:spLocks noGrp="1"/>
           </p:cNvSpPr>
@@ -519,7 +571,7 @@
     </p:spTree>
     <p:extLst>
       <p:ext uri="{BB962C8B-B14F-4D97-AF65-F5344CB8AC3E}">
-        <p14:creationId xmlns:p14="http://schemas.microsoft.com/office/powerpoint/2010/main" val="1889112594"/>
+        <p14:creationId xmlns:p14="http://schemas.microsoft.com/office/powerpoint/2010/main" val="4267892935"/>
       </p:ext>
     </p:extLst>
   </p:cSld>
@@ -548,13 +600,7 @@
       </p:grpSpPr>
       <p:sp>
         <p:nvSpPr>
-          <p:cNvPr id="2" name="Vertical Title 1">
-            <a:extLst>
-              <a:ext uri="{FF2B5EF4-FFF2-40B4-BE49-F238E27FC236}">
-                <a16:creationId xmlns:a16="http://schemas.microsoft.com/office/drawing/2014/main" id="{FE2F229D-802B-49BF-9A3A-87B3C8D62A87}"/>
-              </a:ext>
-            </a:extLst>
-          </p:cNvPr>
+          <p:cNvPr id="2" name="Vertical Title 1"/>
           <p:cNvSpPr>
             <a:spLocks noGrp="1"/>
           </p:cNvSpPr>
@@ -564,8 +610,8 @@
         </p:nvSpPr>
         <p:spPr>
           <a:xfrm>
-            <a:off x="8724900" y="365125"/>
-            <a:ext cx="2628900" cy="5811838"/>
+            <a:off x="8648700" y="381000"/>
+            <a:ext cx="2476500" cy="5897562"/>
           </a:xfrm>
         </p:spPr>
         <p:txBody>
@@ -576,18 +622,13 @@
               <a:rPr lang="en-US"/>
               <a:t>Click to edit Master title style</a:t>
             </a:r>
-          </a:p>
-        </p:txBody>
-      </p:sp>
-      <p:sp>
-        <p:nvSpPr>
-          <p:cNvPr id="3" name="Vertical Text Placeholder 2">
-            <a:extLst>
-              <a:ext uri="{FF2B5EF4-FFF2-40B4-BE49-F238E27FC236}">
-                <a16:creationId xmlns:a16="http://schemas.microsoft.com/office/drawing/2014/main" id="{70AC3330-9F52-4404-A583-77CF8AD8239A}"/>
-              </a:ext>
-            </a:extLst>
-          </p:cNvPr>
+            <a:endParaRPr lang="en-US" dirty="0"/>
+          </a:p>
+        </p:txBody>
+      </p:sp>
+      <p:sp>
+        <p:nvSpPr>
+          <p:cNvPr id="3" name="Vertical Text Placeholder 2"/>
           <p:cNvSpPr>
             <a:spLocks noGrp="1"/>
           </p:cNvSpPr>
@@ -597,8 +638,8 @@
         </p:nvSpPr>
         <p:spPr>
           <a:xfrm>
-            <a:off x="838200" y="365125"/>
-            <a:ext cx="7734300" cy="5811838"/>
+            <a:off x="762000" y="381000"/>
+            <a:ext cx="7734300" cy="5897562"/>
           </a:xfrm>
         </p:spPr>
         <p:txBody>
@@ -638,18 +679,13 @@
               <a:rPr lang="en-US"/>
               <a:t>Fifth level</a:t>
             </a:r>
-          </a:p>
-        </p:txBody>
-      </p:sp>
-      <p:sp>
-        <p:nvSpPr>
-          <p:cNvPr id="4" name="Date Placeholder 3">
-            <a:extLst>
-              <a:ext uri="{FF2B5EF4-FFF2-40B4-BE49-F238E27FC236}">
-                <a16:creationId xmlns:a16="http://schemas.microsoft.com/office/drawing/2014/main" id="{E71AE062-F3AE-4ED7-8D03-33FA4525D0E1}"/>
-              </a:ext>
-            </a:extLst>
-          </p:cNvPr>
+            <a:endParaRPr lang="en-US" dirty="0"/>
+          </a:p>
+        </p:txBody>
+      </p:sp>
+      <p:sp>
+        <p:nvSpPr>
+          <p:cNvPr id="4" name="Date Placeholder 3"/>
           <p:cNvSpPr>
             <a:spLocks noGrp="1"/>
           </p:cNvSpPr>
@@ -664,7 +700,7 @@
           <a:p>
             <a:fld id="{471BB4B2-9036-4B80-8BF0-13DB295CF368}" type="datetimeFigureOut">
               <a:rPr lang="en-US" smtClean="0"/>
-              <a:t>2/26/2018</a:t>
+              <a:t>4/9/2018</a:t>
             </a:fld>
             <a:endParaRPr lang="en-US"/>
           </a:p>
@@ -672,13 +708,7 @@
       </p:sp>
       <p:sp>
         <p:nvSpPr>
-          <p:cNvPr id="5" name="Footer Placeholder 4">
-            <a:extLst>
-              <a:ext uri="{FF2B5EF4-FFF2-40B4-BE49-F238E27FC236}">
-                <a16:creationId xmlns:a16="http://schemas.microsoft.com/office/drawing/2014/main" id="{EA4FA7A7-EDEA-46B6-8C3B-15B37427994C}"/>
-              </a:ext>
-            </a:extLst>
-          </p:cNvPr>
+          <p:cNvPr id="5" name="Footer Placeholder 4"/>
           <p:cNvSpPr>
             <a:spLocks noGrp="1"/>
           </p:cNvSpPr>
@@ -697,13 +727,7 @@
       </p:sp>
       <p:sp>
         <p:nvSpPr>
-          <p:cNvPr id="6" name="Slide Number Placeholder 5">
-            <a:extLst>
-              <a:ext uri="{FF2B5EF4-FFF2-40B4-BE49-F238E27FC236}">
-                <a16:creationId xmlns:a16="http://schemas.microsoft.com/office/drawing/2014/main" id="{0ECEE0B8-CDB2-4272-9AF5-B7A66B2C41A4}"/>
-              </a:ext>
-            </a:extLst>
-          </p:cNvPr>
+          <p:cNvPr id="6" name="Slide Number Placeholder 5"/>
           <p:cNvSpPr>
             <a:spLocks noGrp="1"/>
           </p:cNvSpPr>
@@ -727,13 +751,18 @@
     </p:spTree>
     <p:extLst>
       <p:ext uri="{BB962C8B-B14F-4D97-AF65-F5344CB8AC3E}">
-        <p14:creationId xmlns:p14="http://schemas.microsoft.com/office/powerpoint/2010/main" val="2517224545"/>
+        <p14:creationId xmlns:p14="http://schemas.microsoft.com/office/powerpoint/2010/main" val="2172936831"/>
       </p:ext>
     </p:extLst>
   </p:cSld>
   <p:clrMapOvr>
     <a:masterClrMapping/>
   </p:clrMapOvr>
+  <p:extLst>
+    <p:ext uri="{DCECCB84-F9BA-43D5-87BE-67443E8EF086}">
+      <p15:sldGuideLst xmlns:p15="http://schemas.microsoft.com/office/powerpoint/2012/main"/>
+    </p:ext>
+  </p:extLst>
 </p:sldLayout>
 </file>
 
@@ -756,13 +785,7 @@
       </p:grpSpPr>
       <p:sp>
         <p:nvSpPr>
-          <p:cNvPr id="2" name="Title 1">
-            <a:extLst>
-              <a:ext uri="{FF2B5EF4-FFF2-40B4-BE49-F238E27FC236}">
-                <a16:creationId xmlns:a16="http://schemas.microsoft.com/office/drawing/2014/main" id="{5163B950-168D-41D6-B487-C05D46CDC079}"/>
-              </a:ext>
-            </a:extLst>
-          </p:cNvPr>
+          <p:cNvPr id="2" name="Title 1"/>
           <p:cNvSpPr>
             <a:spLocks noGrp="1"/>
           </p:cNvSpPr>
@@ -779,18 +802,13 @@
               <a:rPr lang="en-US"/>
               <a:t>Click to edit Master title style</a:t>
             </a:r>
-          </a:p>
-        </p:txBody>
-      </p:sp>
-      <p:sp>
-        <p:nvSpPr>
-          <p:cNvPr id="3" name="Content Placeholder 2">
-            <a:extLst>
-              <a:ext uri="{FF2B5EF4-FFF2-40B4-BE49-F238E27FC236}">
-                <a16:creationId xmlns:a16="http://schemas.microsoft.com/office/drawing/2014/main" id="{ACBDE8C9-DE5F-461E-A659-356AABF65133}"/>
-              </a:ext>
-            </a:extLst>
-          </p:cNvPr>
+            <a:endParaRPr lang="en-US" dirty="0"/>
+          </a:p>
+        </p:txBody>
+      </p:sp>
+      <p:sp>
+        <p:nvSpPr>
+          <p:cNvPr id="3" name="Content Placeholder 2"/>
           <p:cNvSpPr>
             <a:spLocks noGrp="1"/>
           </p:cNvSpPr>
@@ -836,18 +854,13 @@
               <a:rPr lang="en-US"/>
               <a:t>Fifth level</a:t>
             </a:r>
-          </a:p>
-        </p:txBody>
-      </p:sp>
-      <p:sp>
-        <p:nvSpPr>
-          <p:cNvPr id="4" name="Date Placeholder 3">
-            <a:extLst>
-              <a:ext uri="{FF2B5EF4-FFF2-40B4-BE49-F238E27FC236}">
-                <a16:creationId xmlns:a16="http://schemas.microsoft.com/office/drawing/2014/main" id="{137FDB84-C6B0-43DB-908B-6105EE72C450}"/>
-              </a:ext>
-            </a:extLst>
-          </p:cNvPr>
+            <a:endParaRPr lang="en-US" dirty="0"/>
+          </a:p>
+        </p:txBody>
+      </p:sp>
+      <p:sp>
+        <p:nvSpPr>
+          <p:cNvPr id="4" name="Date Placeholder 3"/>
           <p:cNvSpPr>
             <a:spLocks noGrp="1"/>
           </p:cNvSpPr>
@@ -862,7 +875,7 @@
           <a:p>
             <a:fld id="{471BB4B2-9036-4B80-8BF0-13DB295CF368}" type="datetimeFigureOut">
               <a:rPr lang="en-US" smtClean="0"/>
-              <a:t>2/26/2018</a:t>
+              <a:t>4/9/2018</a:t>
             </a:fld>
             <a:endParaRPr lang="en-US"/>
           </a:p>
@@ -870,13 +883,7 @@
       </p:sp>
       <p:sp>
         <p:nvSpPr>
-          <p:cNvPr id="5" name="Footer Placeholder 4">
-            <a:extLst>
-              <a:ext uri="{FF2B5EF4-FFF2-40B4-BE49-F238E27FC236}">
-                <a16:creationId xmlns:a16="http://schemas.microsoft.com/office/drawing/2014/main" id="{61FEDCAC-E203-408C-9161-D58E0C7CB9E8}"/>
-              </a:ext>
-            </a:extLst>
-          </p:cNvPr>
+          <p:cNvPr id="5" name="Footer Placeholder 4"/>
           <p:cNvSpPr>
             <a:spLocks noGrp="1"/>
           </p:cNvSpPr>
@@ -895,13 +902,7 @@
       </p:sp>
       <p:sp>
         <p:nvSpPr>
-          <p:cNvPr id="6" name="Slide Number Placeholder 5">
-            <a:extLst>
-              <a:ext uri="{FF2B5EF4-FFF2-40B4-BE49-F238E27FC236}">
-                <a16:creationId xmlns:a16="http://schemas.microsoft.com/office/drawing/2014/main" id="{B95AF1CA-B287-4EB6-9F1E-92B5F71BE063}"/>
-              </a:ext>
-            </a:extLst>
-          </p:cNvPr>
+          <p:cNvPr id="6" name="Slide Number Placeholder 5"/>
           <p:cNvSpPr>
             <a:spLocks noGrp="1"/>
           </p:cNvSpPr>
@@ -925,7 +926,7 @@
     </p:spTree>
     <p:extLst>
       <p:ext uri="{BB962C8B-B14F-4D97-AF65-F5344CB8AC3E}">
-        <p14:creationId xmlns:p14="http://schemas.microsoft.com/office/powerpoint/2010/main" val="2258877532"/>
+        <p14:creationId xmlns:p14="http://schemas.microsoft.com/office/powerpoint/2010/main" val="298793873"/>
       </p:ext>
     </p:extLst>
   </p:cSld>
@@ -954,13 +955,7 @@
       </p:grpSpPr>
       <p:sp>
         <p:nvSpPr>
-          <p:cNvPr id="2" name="Title 1">
-            <a:extLst>
-              <a:ext uri="{FF2B5EF4-FFF2-40B4-BE49-F238E27FC236}">
-                <a16:creationId xmlns:a16="http://schemas.microsoft.com/office/drawing/2014/main" id="{EB246FB9-2671-470F-8F30-EDAC1AB8E316}"/>
-              </a:ext>
-            </a:extLst>
-          </p:cNvPr>
+          <p:cNvPr id="2" name="Title 1"/>
           <p:cNvSpPr>
             <a:spLocks noGrp="1"/>
           </p:cNvSpPr>
@@ -970,15 +965,20 @@
         </p:nvSpPr>
         <p:spPr>
           <a:xfrm>
-            <a:off x="831850" y="1709738"/>
-            <a:ext cx="10515600" cy="2852737"/>
+            <a:off x="1261872" y="758952"/>
+            <a:ext cx="9418320" cy="4041648"/>
           </a:xfrm>
         </p:spPr>
         <p:txBody>
-          <a:bodyPr anchor="b"/>
+          <a:bodyPr anchor="b">
+            <a:normAutofit/>
+          </a:bodyPr>
           <a:lstStyle>
             <a:lvl1pPr>
-              <a:defRPr sz="6000"/>
+              <a:lnSpc>
+                <a:spcPct val="85000"/>
+              </a:lnSpc>
+              <a:defRPr sz="7200" b="0"/>
             </a:lvl1pPr>
           </a:lstStyle>
           <a:p>
@@ -986,18 +986,13 @@
               <a:rPr lang="en-US"/>
               <a:t>Click to edit Master title style</a:t>
             </a:r>
-          </a:p>
-        </p:txBody>
-      </p:sp>
-      <p:sp>
-        <p:nvSpPr>
-          <p:cNvPr id="3" name="Text Placeholder 2">
-            <a:extLst>
-              <a:ext uri="{FF2B5EF4-FFF2-40B4-BE49-F238E27FC236}">
-                <a16:creationId xmlns:a16="http://schemas.microsoft.com/office/drawing/2014/main" id="{2907D6FE-C18C-4B36-AE58-EAE5162C3612}"/>
-              </a:ext>
-            </a:extLst>
-          </p:cNvPr>
+            <a:endParaRPr lang="en-US" dirty="0"/>
+          </a:p>
+        </p:txBody>
+      </p:sp>
+      <p:sp>
+        <p:nvSpPr>
+          <p:cNvPr id="3" name="Text Placeholder 2"/>
           <p:cNvSpPr>
             <a:spLocks noGrp="1"/>
           </p:cNvSpPr>
@@ -1007,102 +1002,105 @@
         </p:nvSpPr>
         <p:spPr>
           <a:xfrm>
-            <a:off x="831850" y="4589463"/>
-            <a:ext cx="10515600" cy="1500187"/>
+            <a:off x="1261872" y="4800600"/>
+            <a:ext cx="9418320" cy="1691640"/>
           </a:xfrm>
         </p:spPr>
         <p:txBody>
-          <a:bodyPr/>
+          <a:bodyPr anchor="t">
+            <a:normAutofit/>
+          </a:bodyPr>
           <a:lstStyle>
             <a:lvl1pPr marL="0" indent="0">
               <a:buNone/>
-              <a:defRPr sz="2400">
+              <a:defRPr sz="2200">
+                <a:solidFill>
+                  <a:schemeClr val="tx1">
+                    <a:lumMod val="65000"/>
+                    <a:lumOff val="35000"/>
+                  </a:schemeClr>
+                </a:solidFill>
+              </a:defRPr>
+            </a:lvl1pPr>
+            <a:lvl2pPr marL="457200" indent="0">
+              <a:buNone/>
+              <a:defRPr sz="1800">
                 <a:solidFill>
                   <a:schemeClr val="tx1">
                     <a:tint val="75000"/>
                   </a:schemeClr>
                 </a:solidFill>
               </a:defRPr>
-            </a:lvl1pPr>
-            <a:lvl2pPr marL="457200" indent="0">
-              <a:buNone/>
-              <a:defRPr sz="2000">
+            </a:lvl2pPr>
+            <a:lvl3pPr marL="914400" indent="0">
+              <a:buNone/>
+              <a:defRPr sz="1600">
                 <a:solidFill>
                   <a:schemeClr val="tx1">
                     <a:tint val="75000"/>
                   </a:schemeClr>
                 </a:solidFill>
               </a:defRPr>
-            </a:lvl2pPr>
-            <a:lvl3pPr marL="914400" indent="0">
-              <a:buNone/>
-              <a:defRPr sz="1800">
+            </a:lvl3pPr>
+            <a:lvl4pPr marL="1371600" indent="0">
+              <a:buNone/>
+              <a:defRPr sz="1400">
                 <a:solidFill>
                   <a:schemeClr val="tx1">
                     <a:tint val="75000"/>
                   </a:schemeClr>
                 </a:solidFill>
               </a:defRPr>
-            </a:lvl3pPr>
-            <a:lvl4pPr marL="1371600" indent="0">
-              <a:buNone/>
-              <a:defRPr sz="1600">
+            </a:lvl4pPr>
+            <a:lvl5pPr marL="1828800" indent="0">
+              <a:buNone/>
+              <a:defRPr sz="1400">
                 <a:solidFill>
                   <a:schemeClr val="tx1">
                     <a:tint val="75000"/>
                   </a:schemeClr>
                 </a:solidFill>
               </a:defRPr>
-            </a:lvl4pPr>
-            <a:lvl5pPr marL="1828800" indent="0">
-              <a:buNone/>
-              <a:defRPr sz="1600">
+            </a:lvl5pPr>
+            <a:lvl6pPr marL="2286000" indent="0">
+              <a:buNone/>
+              <a:defRPr sz="1400">
                 <a:solidFill>
                   <a:schemeClr val="tx1">
                     <a:tint val="75000"/>
                   </a:schemeClr>
                 </a:solidFill>
               </a:defRPr>
-            </a:lvl5pPr>
-            <a:lvl6pPr marL="2286000" indent="0">
-              <a:buNone/>
-              <a:defRPr sz="1600">
+            </a:lvl6pPr>
+            <a:lvl7pPr marL="2743200" indent="0">
+              <a:buNone/>
+              <a:defRPr sz="1400">
                 <a:solidFill>
                   <a:schemeClr val="tx1">
                     <a:tint val="75000"/>
                   </a:schemeClr>
                 </a:solidFill>
               </a:defRPr>
-            </a:lvl6pPr>
-            <a:lvl7pPr marL="2743200" indent="0">
-              <a:buNone/>
-              <a:defRPr sz="1600">
+            </a:lvl7pPr>
+            <a:lvl8pPr marL="3200400" indent="0">
+              <a:buNone/>
+              <a:defRPr sz="1400">
                 <a:solidFill>
                   <a:schemeClr val="tx1">
                     <a:tint val="75000"/>
                   </a:schemeClr>
                 </a:solidFill>
               </a:defRPr>
-            </a:lvl7pPr>
-            <a:lvl8pPr marL="3200400" indent="0">
-              <a:buNone/>
-              <a:defRPr sz="1600">
+            </a:lvl8pPr>
+            <a:lvl9pPr marL="3657600" indent="0">
+              <a:buNone/>
+              <a:defRPr sz="1400">
                 <a:solidFill>
                   <a:schemeClr val="tx1">
                     <a:tint val="75000"/>
                   </a:schemeClr>
                 </a:solidFill>
               </a:defRPr>
-            </a:lvl8pPr>
-            <a:lvl9pPr marL="3657600" indent="0">
-              <a:buNone/>
-              <a:defRPr sz="1600">
-                <a:solidFill>
-                  <a:schemeClr val="tx1">
-                    <a:tint val="75000"/>
-                  </a:schemeClr>
-                </a:solidFill>
-              </a:defRPr>
             </a:lvl9pPr>
           </a:lstStyle>
           <a:p>
@@ -1116,13 +1114,7 @@
       </p:sp>
       <p:sp>
         <p:nvSpPr>
-          <p:cNvPr id="4" name="Date Placeholder 3">
-            <a:extLst>
-              <a:ext uri="{FF2B5EF4-FFF2-40B4-BE49-F238E27FC236}">
-                <a16:creationId xmlns:a16="http://schemas.microsoft.com/office/drawing/2014/main" id="{2B681118-19A4-419B-ABEF-296FFAAE4318}"/>
-              </a:ext>
-            </a:extLst>
-          </p:cNvPr>
+          <p:cNvPr id="4" name="Date Placeholder 3"/>
           <p:cNvSpPr>
             <a:spLocks noGrp="1"/>
           </p:cNvSpPr>
@@ -1137,7 +1129,7 @@
           <a:p>
             <a:fld id="{471BB4B2-9036-4B80-8BF0-13DB295CF368}" type="datetimeFigureOut">
               <a:rPr lang="en-US" smtClean="0"/>
-              <a:t>2/26/2018</a:t>
+              <a:t>4/9/2018</a:t>
             </a:fld>
             <a:endParaRPr lang="en-US"/>
           </a:p>
@@ -1145,13 +1137,7 @@
       </p:sp>
       <p:sp>
         <p:nvSpPr>
-          <p:cNvPr id="5" name="Footer Placeholder 4">
-            <a:extLst>
-              <a:ext uri="{FF2B5EF4-FFF2-40B4-BE49-F238E27FC236}">
-                <a16:creationId xmlns:a16="http://schemas.microsoft.com/office/drawing/2014/main" id="{44A97495-D2E9-46A1-B518-8070E8C2513B}"/>
-              </a:ext>
-            </a:extLst>
-          </p:cNvPr>
+          <p:cNvPr id="5" name="Footer Placeholder 4"/>
           <p:cNvSpPr>
             <a:spLocks noGrp="1"/>
           </p:cNvSpPr>
@@ -1170,13 +1156,7 @@
       </p:sp>
       <p:sp>
         <p:nvSpPr>
-          <p:cNvPr id="6" name="Slide Number Placeholder 5">
-            <a:extLst>
-              <a:ext uri="{FF2B5EF4-FFF2-40B4-BE49-F238E27FC236}">
-                <a16:creationId xmlns:a16="http://schemas.microsoft.com/office/drawing/2014/main" id="{6FAE0B44-C21F-4CFC-ACE7-062C957BB339}"/>
-              </a:ext>
-            </a:extLst>
-          </p:cNvPr>
+          <p:cNvPr id="6" name="Slide Number Placeholder 5"/>
           <p:cNvSpPr>
             <a:spLocks noGrp="1"/>
           </p:cNvSpPr>
@@ -1197,16 +1177,59 @@
           </a:p>
         </p:txBody>
       </p:sp>
+      <p:sp>
+        <p:nvSpPr>
+          <p:cNvPr id="7" name="Rectangle 6"/>
+          <p:cNvSpPr/>
+          <p:nvPr/>
+        </p:nvSpPr>
+        <p:spPr>
+          <a:xfrm>
+            <a:off x="0" y="0"/>
+            <a:ext cx="457200" cy="6858000"/>
+          </a:xfrm>
+          <a:prstGeom prst="rect">
+            <a:avLst/>
+          </a:prstGeom>
+          <a:solidFill>
+            <a:schemeClr val="accent1"/>
+          </a:solidFill>
+          <a:ln>
+            <a:noFill/>
+          </a:ln>
+        </p:spPr>
+        <p:style>
+          <a:lnRef idx="2">
+            <a:schemeClr val="accent1">
+              <a:shade val="50000"/>
+            </a:schemeClr>
+          </a:lnRef>
+          <a:fillRef idx="1">
+            <a:schemeClr val="accent1"/>
+          </a:fillRef>
+          <a:effectRef idx="0">
+            <a:schemeClr val="accent1"/>
+          </a:effectRef>
+          <a:fontRef idx="minor">
+            <a:schemeClr val="lt1"/>
+          </a:fontRef>
+        </p:style>
+      </p:sp>
     </p:spTree>
     <p:extLst>
       <p:ext uri="{BB962C8B-B14F-4D97-AF65-F5344CB8AC3E}">
-        <p14:creationId xmlns:p14="http://schemas.microsoft.com/office/powerpoint/2010/main" val="3818352607"/>
+        <p14:creationId xmlns:p14="http://schemas.microsoft.com/office/powerpoint/2010/main" val="299486848"/>
       </p:ext>
     </p:extLst>
   </p:cSld>
   <p:clrMapOvr>
     <a:masterClrMapping/>
   </p:clrMapOvr>
+  <p:extLst>
+    <p:ext uri="{DCECCB84-F9BA-43D5-87BE-67443E8EF086}">
+      <p15:sldGuideLst xmlns:p15="http://schemas.microsoft.com/office/powerpoint/2012/main"/>
+    </p:ext>
+  </p:extLst>
 </p:sldLayout>
 </file>
 
@@ -1229,13 +1252,7 @@
       </p:grpSpPr>
       <p:sp>
         <p:nvSpPr>
-          <p:cNvPr id="2" name="Title 1">
-            <a:extLst>
-              <a:ext uri="{FF2B5EF4-FFF2-40B4-BE49-F238E27FC236}">
-                <a16:creationId xmlns:a16="http://schemas.microsoft.com/office/drawing/2014/main" id="{C979D8F8-846F-4A07-A46A-BD20C316C296}"/>
-              </a:ext>
-            </a:extLst>
-          </p:cNvPr>
+          <p:cNvPr id="2" name="Title 1"/>
           <p:cNvSpPr>
             <a:spLocks noGrp="1"/>
           </p:cNvSpPr>
@@ -1252,18 +1269,13 @@
               <a:rPr lang="en-US"/>
               <a:t>Click to edit Master title style</a:t>
             </a:r>
-          </a:p>
-        </p:txBody>
-      </p:sp>
-      <p:sp>
-        <p:nvSpPr>
-          <p:cNvPr id="3" name="Content Placeholder 2">
-            <a:extLst>
-              <a:ext uri="{FF2B5EF4-FFF2-40B4-BE49-F238E27FC236}">
-                <a16:creationId xmlns:a16="http://schemas.microsoft.com/office/drawing/2014/main" id="{BBAC6EB2-5CB9-4C96-9E85-FD39B457B6C7}"/>
-              </a:ext>
-            </a:extLst>
-          </p:cNvPr>
+            <a:endParaRPr lang="en-US" dirty="0"/>
+          </a:p>
+        </p:txBody>
+      </p:sp>
+      <p:sp>
+        <p:nvSpPr>
+          <p:cNvPr id="3" name="Content Placeholder 2"/>
           <p:cNvSpPr>
             <a:spLocks noGrp="1"/>
           </p:cNvSpPr>
@@ -1273,13 +1285,41 @@
         </p:nvSpPr>
         <p:spPr>
           <a:xfrm>
-            <a:off x="838200" y="1825625"/>
-            <a:ext cx="5181600" cy="4351338"/>
+            <a:off x="1261872" y="1828800"/>
+            <a:ext cx="4480560" cy="4351337"/>
           </a:xfrm>
         </p:spPr>
         <p:txBody>
           <a:bodyPr/>
-          <a:lstStyle/>
+          <a:lstStyle>
+            <a:lvl1pPr>
+              <a:defRPr sz="1800"/>
+            </a:lvl1pPr>
+            <a:lvl2pPr>
+              <a:defRPr sz="1600"/>
+            </a:lvl2pPr>
+            <a:lvl3pPr>
+              <a:defRPr sz="1400"/>
+            </a:lvl3pPr>
+            <a:lvl4pPr>
+              <a:defRPr sz="1400"/>
+            </a:lvl4pPr>
+            <a:lvl5pPr>
+              <a:defRPr sz="1400"/>
+            </a:lvl5pPr>
+            <a:lvl6pPr>
+              <a:defRPr sz="1400"/>
+            </a:lvl6pPr>
+            <a:lvl7pPr>
+              <a:defRPr sz="1400"/>
+            </a:lvl7pPr>
+            <a:lvl8pPr>
+              <a:defRPr sz="1400"/>
+            </a:lvl8pPr>
+            <a:lvl9pPr>
+              <a:defRPr sz="1400"/>
+            </a:lvl9pPr>
+          </a:lstStyle>
           <a:p>
             <a:pPr lvl="0"/>
             <a:r>
@@ -1314,18 +1354,13 @@
               <a:rPr lang="en-US"/>
               <a:t>Fifth level</a:t>
             </a:r>
-          </a:p>
-        </p:txBody>
-      </p:sp>
-      <p:sp>
-        <p:nvSpPr>
-          <p:cNvPr id="4" name="Content Placeholder 3">
-            <a:extLst>
-              <a:ext uri="{FF2B5EF4-FFF2-40B4-BE49-F238E27FC236}">
-                <a16:creationId xmlns:a16="http://schemas.microsoft.com/office/drawing/2014/main" id="{9CE0BC69-3B76-4C83-975F-2FE26DDBEEB2}"/>
-              </a:ext>
-            </a:extLst>
-          </p:cNvPr>
+            <a:endParaRPr lang="en-US" dirty="0"/>
+          </a:p>
+        </p:txBody>
+      </p:sp>
+      <p:sp>
+        <p:nvSpPr>
+          <p:cNvPr id="4" name="Content Placeholder 3"/>
           <p:cNvSpPr>
             <a:spLocks noGrp="1"/>
           </p:cNvSpPr>
@@ -1335,13 +1370,41 @@
         </p:nvSpPr>
         <p:spPr>
           <a:xfrm>
-            <a:off x="6172200" y="1825625"/>
-            <a:ext cx="5181600" cy="4351338"/>
+            <a:off x="6126480" y="1828800"/>
+            <a:ext cx="4480560" cy="4351337"/>
           </a:xfrm>
         </p:spPr>
         <p:txBody>
           <a:bodyPr/>
-          <a:lstStyle/>
+          <a:lstStyle>
+            <a:lvl1pPr>
+              <a:defRPr sz="1800"/>
+            </a:lvl1pPr>
+            <a:lvl2pPr>
+              <a:defRPr sz="1600"/>
+            </a:lvl2pPr>
+            <a:lvl3pPr>
+              <a:defRPr sz="1400"/>
+            </a:lvl3pPr>
+            <a:lvl4pPr>
+              <a:defRPr sz="1400"/>
+            </a:lvl4pPr>
+            <a:lvl5pPr>
+              <a:defRPr sz="1400"/>
+            </a:lvl5pPr>
+            <a:lvl6pPr>
+              <a:defRPr sz="1400"/>
+            </a:lvl6pPr>
+            <a:lvl7pPr>
+              <a:defRPr sz="1400"/>
+            </a:lvl7pPr>
+            <a:lvl8pPr>
+              <a:defRPr sz="1400"/>
+            </a:lvl8pPr>
+            <a:lvl9pPr>
+              <a:defRPr sz="1400"/>
+            </a:lvl9pPr>
+          </a:lstStyle>
           <a:p>
             <a:pPr lvl="0"/>
             <a:r>
@@ -1376,18 +1439,13 @@
               <a:rPr lang="en-US"/>
               <a:t>Fifth level</a:t>
             </a:r>
-          </a:p>
-        </p:txBody>
-      </p:sp>
-      <p:sp>
-        <p:nvSpPr>
-          <p:cNvPr id="5" name="Date Placeholder 4">
-            <a:extLst>
-              <a:ext uri="{FF2B5EF4-FFF2-40B4-BE49-F238E27FC236}">
-                <a16:creationId xmlns:a16="http://schemas.microsoft.com/office/drawing/2014/main" id="{FA735F92-3C0A-4D5A-A307-B4EFF6D45E26}"/>
-              </a:ext>
-            </a:extLst>
-          </p:cNvPr>
+            <a:endParaRPr lang="en-US" dirty="0"/>
+          </a:p>
+        </p:txBody>
+      </p:sp>
+      <p:sp>
+        <p:nvSpPr>
+          <p:cNvPr id="5" name="Date Placeholder 4"/>
           <p:cNvSpPr>
             <a:spLocks noGrp="1"/>
           </p:cNvSpPr>
@@ -1402,7 +1460,7 @@
           <a:p>
             <a:fld id="{471BB4B2-9036-4B80-8BF0-13DB295CF368}" type="datetimeFigureOut">
               <a:rPr lang="en-US" smtClean="0"/>
-              <a:t>2/26/2018</a:t>
+              <a:t>4/9/2018</a:t>
             </a:fld>
             <a:endParaRPr lang="en-US"/>
           </a:p>
@@ -1410,13 +1468,7 @@
       </p:sp>
       <p:sp>
         <p:nvSpPr>
-          <p:cNvPr id="6" name="Footer Placeholder 5">
-            <a:extLst>
-              <a:ext uri="{FF2B5EF4-FFF2-40B4-BE49-F238E27FC236}">
-                <a16:creationId xmlns:a16="http://schemas.microsoft.com/office/drawing/2014/main" id="{FE8150A7-2366-4011-A8F6-4CBC6CBFB666}"/>
-              </a:ext>
-            </a:extLst>
-          </p:cNvPr>
+          <p:cNvPr id="6" name="Footer Placeholder 5"/>
           <p:cNvSpPr>
             <a:spLocks noGrp="1"/>
           </p:cNvSpPr>
@@ -1435,13 +1487,7 @@
       </p:sp>
       <p:sp>
         <p:nvSpPr>
-          <p:cNvPr id="7" name="Slide Number Placeholder 6">
-            <a:extLst>
-              <a:ext uri="{FF2B5EF4-FFF2-40B4-BE49-F238E27FC236}">
-                <a16:creationId xmlns:a16="http://schemas.microsoft.com/office/drawing/2014/main" id="{E721DB6C-36FB-451C-9CC5-D88C314425E9}"/>
-              </a:ext>
-            </a:extLst>
-          </p:cNvPr>
+          <p:cNvPr id="7" name="Slide Number Placeholder 6"/>
           <p:cNvSpPr>
             <a:spLocks noGrp="1"/>
           </p:cNvSpPr>
@@ -1465,7 +1511,7 @@
     </p:spTree>
     <p:extLst>
       <p:ext uri="{BB962C8B-B14F-4D97-AF65-F5344CB8AC3E}">
-        <p14:creationId xmlns:p14="http://schemas.microsoft.com/office/powerpoint/2010/main" val="3823858335"/>
+        <p14:creationId xmlns:p14="http://schemas.microsoft.com/office/powerpoint/2010/main" val="1803607487"/>
       </p:ext>
     </p:extLst>
   </p:cSld>
@@ -1494,65 +1540,58 @@
       </p:grpSpPr>
       <p:sp>
         <p:nvSpPr>
-          <p:cNvPr id="2" name="Title 1">
-            <a:extLst>
-              <a:ext uri="{FF2B5EF4-FFF2-40B4-BE49-F238E27FC236}">
-                <a16:creationId xmlns:a16="http://schemas.microsoft.com/office/drawing/2014/main" id="{A4A601F5-4266-4316-AAC8-905FF70EBDD2}"/>
-              </a:ext>
-            </a:extLst>
-          </p:cNvPr>
+          <p:cNvPr id="10" name="Title 9"/>
           <p:cNvSpPr>
             <a:spLocks noGrp="1"/>
           </p:cNvSpPr>
           <p:nvPr>
             <p:ph type="title"/>
+          </p:nvPr>
+        </p:nvSpPr>
+        <p:spPr/>
+        <p:txBody>
+          <a:bodyPr/>
+          <a:lstStyle/>
+          <a:p>
+            <a:r>
+              <a:rPr lang="en-US"/>
+              <a:t>Click to edit Master title style</a:t>
+            </a:r>
+            <a:endParaRPr lang="en-US" dirty="0"/>
+          </a:p>
+        </p:txBody>
+      </p:sp>
+      <p:sp>
+        <p:nvSpPr>
+          <p:cNvPr id="3" name="Text Placeholder 2"/>
+          <p:cNvSpPr>
+            <a:spLocks noGrp="1"/>
+          </p:cNvSpPr>
+          <p:nvPr>
+            <p:ph type="body" idx="1"/>
           </p:nvPr>
         </p:nvSpPr>
         <p:spPr>
           <a:xfrm>
-            <a:off x="839788" y="365125"/>
-            <a:ext cx="10515600" cy="1325563"/>
+            <a:off x="1261872" y="1713655"/>
+            <a:ext cx="4480560" cy="731520"/>
           </a:xfrm>
         </p:spPr>
         <p:txBody>
-          <a:bodyPr/>
-          <a:lstStyle/>
-          <a:p>
-            <a:r>
-              <a:rPr lang="en-US"/>
-              <a:t>Click to edit Master title style</a:t>
-            </a:r>
-          </a:p>
-        </p:txBody>
-      </p:sp>
-      <p:sp>
-        <p:nvSpPr>
-          <p:cNvPr id="3" name="Text Placeholder 2">
-            <a:extLst>
-              <a:ext uri="{FF2B5EF4-FFF2-40B4-BE49-F238E27FC236}">
-                <a16:creationId xmlns:a16="http://schemas.microsoft.com/office/drawing/2014/main" id="{9F47FA32-5216-4CA2-A258-C93E56E2368C}"/>
-              </a:ext>
-            </a:extLst>
-          </p:cNvPr>
-          <p:cNvSpPr>
-            <a:spLocks noGrp="1"/>
-          </p:cNvSpPr>
-          <p:nvPr>
-            <p:ph type="body" idx="1"/>
-          </p:nvPr>
-        </p:nvSpPr>
-        <p:spPr>
-          <a:xfrm>
-            <a:off x="839788" y="1681163"/>
-            <a:ext cx="5157787" cy="823912"/>
-          </a:xfrm>
-        </p:spPr>
-        <p:txBody>
-          <a:bodyPr anchor="b"/>
+          <a:bodyPr anchor="b">
+            <a:normAutofit/>
+          </a:bodyPr>
           <a:lstStyle>
             <a:lvl1pPr marL="0" indent="0">
-              <a:buNone/>
-              <a:defRPr sz="2400" b="1"/>
+              <a:spcBef>
+                <a:spcPts val="0"/>
+              </a:spcBef>
+              <a:buNone/>
+              <a:defRPr sz="2000" b="0">
+                <a:solidFill>
+                  <a:schemeClr val="tx2"/>
+                </a:solidFill>
+              </a:defRPr>
             </a:lvl1pPr>
             <a:lvl2pPr marL="457200" indent="0">
               <a:buNone/>
@@ -1598,13 +1637,7 @@
       </p:sp>
       <p:sp>
         <p:nvSpPr>
-          <p:cNvPr id="4" name="Content Placeholder 3">
-            <a:extLst>
-              <a:ext uri="{FF2B5EF4-FFF2-40B4-BE49-F238E27FC236}">
-                <a16:creationId xmlns:a16="http://schemas.microsoft.com/office/drawing/2014/main" id="{F1B938A1-6044-4850-B065-CF260ECF83E1}"/>
-              </a:ext>
-            </a:extLst>
-          </p:cNvPr>
+          <p:cNvPr id="4" name="Content Placeholder 3"/>
           <p:cNvSpPr>
             <a:spLocks noGrp="1"/>
           </p:cNvSpPr>
@@ -1614,13 +1647,41 @@
         </p:nvSpPr>
         <p:spPr>
           <a:xfrm>
-            <a:off x="839788" y="2505075"/>
-            <a:ext cx="5157787" cy="3684588"/>
+            <a:off x="1261872" y="2507550"/>
+            <a:ext cx="4480560" cy="3664650"/>
           </a:xfrm>
         </p:spPr>
         <p:txBody>
           <a:bodyPr/>
-          <a:lstStyle/>
+          <a:lstStyle>
+            <a:lvl1pPr>
+              <a:defRPr sz="1800"/>
+            </a:lvl1pPr>
+            <a:lvl2pPr>
+              <a:defRPr sz="1600"/>
+            </a:lvl2pPr>
+            <a:lvl3pPr>
+              <a:defRPr sz="1400"/>
+            </a:lvl3pPr>
+            <a:lvl4pPr>
+              <a:defRPr sz="1400"/>
+            </a:lvl4pPr>
+            <a:lvl5pPr>
+              <a:defRPr sz="1400"/>
+            </a:lvl5pPr>
+            <a:lvl6pPr>
+              <a:defRPr sz="1400"/>
+            </a:lvl6pPr>
+            <a:lvl7pPr>
+              <a:defRPr sz="1400"/>
+            </a:lvl7pPr>
+            <a:lvl8pPr>
+              <a:defRPr sz="1400"/>
+            </a:lvl8pPr>
+            <a:lvl9pPr>
+              <a:defRPr sz="1400"/>
+            </a:lvl9pPr>
+          </a:lstStyle>
           <a:p>
             <a:pPr lvl="0"/>
             <a:r>
@@ -1655,18 +1716,13 @@
               <a:rPr lang="en-US"/>
               <a:t>Fifth level</a:t>
             </a:r>
-          </a:p>
-        </p:txBody>
-      </p:sp>
-      <p:sp>
-        <p:nvSpPr>
-          <p:cNvPr id="5" name="Text Placeholder 4">
-            <a:extLst>
-              <a:ext uri="{FF2B5EF4-FFF2-40B4-BE49-F238E27FC236}">
-                <a16:creationId xmlns:a16="http://schemas.microsoft.com/office/drawing/2014/main" id="{6FB6961D-8820-41AC-8B41-E1D4BCCBC5E8}"/>
-              </a:ext>
-            </a:extLst>
-          </p:cNvPr>
+            <a:endParaRPr lang="en-US" dirty="0"/>
+          </a:p>
+        </p:txBody>
+      </p:sp>
+      <p:sp>
+        <p:nvSpPr>
+          <p:cNvPr id="5" name="Text Placeholder 4"/>
           <p:cNvSpPr>
             <a:spLocks noGrp="1"/>
           </p:cNvSpPr>
@@ -1676,16 +1732,31 @@
         </p:nvSpPr>
         <p:spPr>
           <a:xfrm>
-            <a:off x="6172200" y="1681163"/>
-            <a:ext cx="5183188" cy="823912"/>
+            <a:off x="6126480" y="1713655"/>
+            <a:ext cx="4480560" cy="731520"/>
           </a:xfrm>
         </p:spPr>
         <p:txBody>
-          <a:bodyPr anchor="b"/>
+          <a:bodyPr anchor="b">
+            <a:normAutofit/>
+          </a:bodyPr>
           <a:lstStyle>
             <a:lvl1pPr marL="0" indent="0">
-              <a:buNone/>
-              <a:defRPr sz="2400" b="1"/>
+              <a:lnSpc>
+                <a:spcPct val="95000"/>
+              </a:lnSpc>
+              <a:spcBef>
+                <a:spcPts val="0"/>
+              </a:spcBef>
+              <a:buNone/>
+              <a:defRPr lang="en-US" sz="2000" b="0" kern="1200" dirty="0">
+                <a:solidFill>
+                  <a:schemeClr val="tx2"/>
+                </a:solidFill>
+                <a:latin typeface="+mn-lt"/>
+                <a:ea typeface="+mn-ea"/>
+                <a:cs typeface="+mn-cs"/>
+              </a:defRPr>
             </a:lvl1pPr>
             <a:lvl2pPr marL="457200" indent="0">
               <a:buNone/>
@@ -1721,7 +1792,16 @@
             </a:lvl9pPr>
           </a:lstStyle>
           <a:p>
-            <a:pPr lvl="0"/>
+            <a:pPr marL="0" lvl="0" indent="0" algn="l" defTabSz="914400" rtl="0" eaLnBrk="1" latinLnBrk="0" hangingPunct="1">
+              <a:lnSpc>
+                <a:spcPct val="90000"/>
+              </a:lnSpc>
+              <a:spcBef>
+                <a:spcPts val="2000"/>
+              </a:spcBef>
+              <a:buFontTx/>
+              <a:buNone/>
+            </a:pPr>
             <a:r>
               <a:rPr lang="en-US"/>
               <a:t>Edit Master text styles</a:t>
@@ -1731,13 +1811,7 @@
       </p:sp>
       <p:sp>
         <p:nvSpPr>
-          <p:cNvPr id="6" name="Content Placeholder 5">
-            <a:extLst>
-              <a:ext uri="{FF2B5EF4-FFF2-40B4-BE49-F238E27FC236}">
-                <a16:creationId xmlns:a16="http://schemas.microsoft.com/office/drawing/2014/main" id="{FE67206C-98D0-453C-8957-7EFAF97A9FA2}"/>
-              </a:ext>
-            </a:extLst>
-          </p:cNvPr>
+          <p:cNvPr id="6" name="Content Placeholder 5"/>
           <p:cNvSpPr>
             <a:spLocks noGrp="1"/>
           </p:cNvSpPr>
@@ -1747,13 +1821,41 @@
         </p:nvSpPr>
         <p:spPr>
           <a:xfrm>
-            <a:off x="6172200" y="2505075"/>
-            <a:ext cx="5183188" cy="3684588"/>
+            <a:off x="6126480" y="2507550"/>
+            <a:ext cx="4480560" cy="3664650"/>
           </a:xfrm>
         </p:spPr>
         <p:txBody>
           <a:bodyPr/>
-          <a:lstStyle/>
+          <a:lstStyle>
+            <a:lvl1pPr>
+              <a:defRPr sz="1800"/>
+            </a:lvl1pPr>
+            <a:lvl2pPr>
+              <a:defRPr sz="1600"/>
+            </a:lvl2pPr>
+            <a:lvl3pPr>
+              <a:defRPr sz="1400"/>
+            </a:lvl3pPr>
+            <a:lvl4pPr>
+              <a:defRPr sz="1400"/>
+            </a:lvl4pPr>
+            <a:lvl5pPr>
+              <a:defRPr sz="1400"/>
+            </a:lvl5pPr>
+            <a:lvl6pPr>
+              <a:defRPr sz="1400"/>
+            </a:lvl6pPr>
+            <a:lvl7pPr>
+              <a:defRPr sz="1400"/>
+            </a:lvl7pPr>
+            <a:lvl8pPr>
+              <a:defRPr sz="1400"/>
+            </a:lvl8pPr>
+            <a:lvl9pPr>
+              <a:defRPr sz="1400"/>
+            </a:lvl9pPr>
+          </a:lstStyle>
           <a:p>
             <a:pPr lvl="0"/>
             <a:r>
@@ -1788,18 +1890,13 @@
               <a:rPr lang="en-US"/>
               <a:t>Fifth level</a:t>
             </a:r>
-          </a:p>
-        </p:txBody>
-      </p:sp>
-      <p:sp>
-        <p:nvSpPr>
-          <p:cNvPr id="7" name="Date Placeholder 6">
-            <a:extLst>
-              <a:ext uri="{FF2B5EF4-FFF2-40B4-BE49-F238E27FC236}">
-                <a16:creationId xmlns:a16="http://schemas.microsoft.com/office/drawing/2014/main" id="{7D468AA7-E6F5-4132-AE9D-FC0BF799F71F}"/>
-              </a:ext>
-            </a:extLst>
-          </p:cNvPr>
+            <a:endParaRPr lang="en-US" dirty="0"/>
+          </a:p>
+        </p:txBody>
+      </p:sp>
+      <p:sp>
+        <p:nvSpPr>
+          <p:cNvPr id="7" name="Date Placeholder 6"/>
           <p:cNvSpPr>
             <a:spLocks noGrp="1"/>
           </p:cNvSpPr>
@@ -1814,7 +1911,7 @@
           <a:p>
             <a:fld id="{471BB4B2-9036-4B80-8BF0-13DB295CF368}" type="datetimeFigureOut">
               <a:rPr lang="en-US" smtClean="0"/>
-              <a:t>2/26/2018</a:t>
+              <a:t>4/9/2018</a:t>
             </a:fld>
             <a:endParaRPr lang="en-US"/>
           </a:p>
@@ -1822,13 +1919,7 @@
       </p:sp>
       <p:sp>
         <p:nvSpPr>
-          <p:cNvPr id="8" name="Footer Placeholder 7">
-            <a:extLst>
-              <a:ext uri="{FF2B5EF4-FFF2-40B4-BE49-F238E27FC236}">
-                <a16:creationId xmlns:a16="http://schemas.microsoft.com/office/drawing/2014/main" id="{B00486E5-ACE6-4960-A422-0796AF16544B}"/>
-              </a:ext>
-            </a:extLst>
-          </p:cNvPr>
+          <p:cNvPr id="8" name="Footer Placeholder 7"/>
           <p:cNvSpPr>
             <a:spLocks noGrp="1"/>
           </p:cNvSpPr>
@@ -1847,13 +1938,7 @@
       </p:sp>
       <p:sp>
         <p:nvSpPr>
-          <p:cNvPr id="9" name="Slide Number Placeholder 8">
-            <a:extLst>
-              <a:ext uri="{FF2B5EF4-FFF2-40B4-BE49-F238E27FC236}">
-                <a16:creationId xmlns:a16="http://schemas.microsoft.com/office/drawing/2014/main" id="{3CBB8016-8CBC-4485-9619-FF7C55A3D3AF}"/>
-              </a:ext>
-            </a:extLst>
-          </p:cNvPr>
+          <p:cNvPr id="9" name="Slide Number Placeholder 8"/>
           <p:cNvSpPr>
             <a:spLocks noGrp="1"/>
           </p:cNvSpPr>
@@ -1877,7 +1962,7 @@
     </p:spTree>
     <p:extLst>
       <p:ext uri="{BB962C8B-B14F-4D97-AF65-F5344CB8AC3E}">
-        <p14:creationId xmlns:p14="http://schemas.microsoft.com/office/powerpoint/2010/main" val="4203697351"/>
+        <p14:creationId xmlns:p14="http://schemas.microsoft.com/office/powerpoint/2010/main" val="1317769596"/>
       </p:ext>
     </p:extLst>
   </p:cSld>
@@ -1906,13 +1991,7 @@
       </p:grpSpPr>
       <p:sp>
         <p:nvSpPr>
-          <p:cNvPr id="2" name="Title 1">
-            <a:extLst>
-              <a:ext uri="{FF2B5EF4-FFF2-40B4-BE49-F238E27FC236}">
-                <a16:creationId xmlns:a16="http://schemas.microsoft.com/office/drawing/2014/main" id="{3F74E919-AFC1-4478-B4A9-71D24F5B893E}"/>
-              </a:ext>
-            </a:extLst>
-          </p:cNvPr>
+          <p:cNvPr id="6" name="Title 5"/>
           <p:cNvSpPr>
             <a:spLocks noGrp="1"/>
           </p:cNvSpPr>
@@ -1929,18 +2008,13 @@
               <a:rPr lang="en-US"/>
               <a:t>Click to edit Master title style</a:t>
             </a:r>
-          </a:p>
-        </p:txBody>
-      </p:sp>
-      <p:sp>
-        <p:nvSpPr>
-          <p:cNvPr id="3" name="Date Placeholder 2">
-            <a:extLst>
-              <a:ext uri="{FF2B5EF4-FFF2-40B4-BE49-F238E27FC236}">
-                <a16:creationId xmlns:a16="http://schemas.microsoft.com/office/drawing/2014/main" id="{BDEDD80E-FFD4-490F-8307-22CFE027F4B1}"/>
-              </a:ext>
-            </a:extLst>
-          </p:cNvPr>
+            <a:endParaRPr lang="en-US" dirty="0"/>
+          </a:p>
+        </p:txBody>
+      </p:sp>
+      <p:sp>
+        <p:nvSpPr>
+          <p:cNvPr id="3" name="Date Placeholder 2"/>
           <p:cNvSpPr>
             <a:spLocks noGrp="1"/>
           </p:cNvSpPr>
@@ -1955,7 +2029,7 @@
           <a:p>
             <a:fld id="{471BB4B2-9036-4B80-8BF0-13DB295CF368}" type="datetimeFigureOut">
               <a:rPr lang="en-US" smtClean="0"/>
-              <a:t>2/26/2018</a:t>
+              <a:t>4/9/2018</a:t>
             </a:fld>
             <a:endParaRPr lang="en-US"/>
           </a:p>
@@ -1963,13 +2037,7 @@
       </p:sp>
       <p:sp>
         <p:nvSpPr>
-          <p:cNvPr id="4" name="Footer Placeholder 3">
-            <a:extLst>
-              <a:ext uri="{FF2B5EF4-FFF2-40B4-BE49-F238E27FC236}">
-                <a16:creationId xmlns:a16="http://schemas.microsoft.com/office/drawing/2014/main" id="{1FBA8A6B-5469-4913-95FF-D87568F09213}"/>
-              </a:ext>
-            </a:extLst>
-          </p:cNvPr>
+          <p:cNvPr id="4" name="Footer Placeholder 3"/>
           <p:cNvSpPr>
             <a:spLocks noGrp="1"/>
           </p:cNvSpPr>
@@ -1988,13 +2056,7 @@
       </p:sp>
       <p:sp>
         <p:nvSpPr>
-          <p:cNvPr id="5" name="Slide Number Placeholder 4">
-            <a:extLst>
-              <a:ext uri="{FF2B5EF4-FFF2-40B4-BE49-F238E27FC236}">
-                <a16:creationId xmlns:a16="http://schemas.microsoft.com/office/drawing/2014/main" id="{706A3870-2941-47E0-B7F8-62518022F756}"/>
-              </a:ext>
-            </a:extLst>
-          </p:cNvPr>
+          <p:cNvPr id="5" name="Slide Number Placeholder 4"/>
           <p:cNvSpPr>
             <a:spLocks noGrp="1"/>
           </p:cNvSpPr>
@@ -2018,7 +2080,7 @@
     </p:spTree>
     <p:extLst>
       <p:ext uri="{BB962C8B-B14F-4D97-AF65-F5344CB8AC3E}">
-        <p14:creationId xmlns:p14="http://schemas.microsoft.com/office/powerpoint/2010/main" val="1108742418"/>
+        <p14:creationId xmlns:p14="http://schemas.microsoft.com/office/powerpoint/2010/main" val="2439704606"/>
       </p:ext>
     </p:extLst>
   </p:cSld>
@@ -2047,13 +2109,7 @@
       </p:grpSpPr>
       <p:sp>
         <p:nvSpPr>
-          <p:cNvPr id="2" name="Date Placeholder 1">
-            <a:extLst>
-              <a:ext uri="{FF2B5EF4-FFF2-40B4-BE49-F238E27FC236}">
-                <a16:creationId xmlns:a16="http://schemas.microsoft.com/office/drawing/2014/main" id="{AB956989-1FC1-4CEA-B6B9-4C3A97D44AB2}"/>
-              </a:ext>
-            </a:extLst>
-          </p:cNvPr>
+          <p:cNvPr id="2" name="Date Placeholder 1"/>
           <p:cNvSpPr>
             <a:spLocks noGrp="1"/>
           </p:cNvSpPr>
@@ -2068,7 +2124,7 @@
           <a:p>
             <a:fld id="{471BB4B2-9036-4B80-8BF0-13DB295CF368}" type="datetimeFigureOut">
               <a:rPr lang="en-US" smtClean="0"/>
-              <a:t>2/26/2018</a:t>
+              <a:t>4/9/2018</a:t>
             </a:fld>
             <a:endParaRPr lang="en-US"/>
           </a:p>
@@ -2076,13 +2132,7 @@
       </p:sp>
       <p:sp>
         <p:nvSpPr>
-          <p:cNvPr id="3" name="Footer Placeholder 2">
-            <a:extLst>
-              <a:ext uri="{FF2B5EF4-FFF2-40B4-BE49-F238E27FC236}">
-                <a16:creationId xmlns:a16="http://schemas.microsoft.com/office/drawing/2014/main" id="{EBEF2D05-DB67-47EE-A11D-4256C32D3490}"/>
-              </a:ext>
-            </a:extLst>
-          </p:cNvPr>
+          <p:cNvPr id="3" name="Footer Placeholder 2"/>
           <p:cNvSpPr>
             <a:spLocks noGrp="1"/>
           </p:cNvSpPr>
@@ -2101,13 +2151,7 @@
       </p:sp>
       <p:sp>
         <p:nvSpPr>
-          <p:cNvPr id="4" name="Slide Number Placeholder 3">
-            <a:extLst>
-              <a:ext uri="{FF2B5EF4-FFF2-40B4-BE49-F238E27FC236}">
-                <a16:creationId xmlns:a16="http://schemas.microsoft.com/office/drawing/2014/main" id="{2540DAD9-4A4D-47D3-ABF4-4D0A23958229}"/>
-              </a:ext>
-            </a:extLst>
-          </p:cNvPr>
+          <p:cNvPr id="4" name="Slide Number Placeholder 3"/>
           <p:cNvSpPr>
             <a:spLocks noGrp="1"/>
           </p:cNvSpPr>
@@ -2131,7 +2175,7 @@
     </p:spTree>
     <p:extLst>
       <p:ext uri="{BB962C8B-B14F-4D97-AF65-F5344CB8AC3E}">
-        <p14:creationId xmlns:p14="http://schemas.microsoft.com/office/powerpoint/2010/main" val="2173092437"/>
+        <p14:creationId xmlns:p14="http://schemas.microsoft.com/office/powerpoint/2010/main" val="476572802"/>
       </p:ext>
     </p:extLst>
   </p:cSld>
@@ -2160,13 +2204,7 @@
       </p:grpSpPr>
       <p:sp>
         <p:nvSpPr>
-          <p:cNvPr id="2" name="Title 1">
-            <a:extLst>
-              <a:ext uri="{FF2B5EF4-FFF2-40B4-BE49-F238E27FC236}">
-                <a16:creationId xmlns:a16="http://schemas.microsoft.com/office/drawing/2014/main" id="{89CE5DD6-1F79-4B78-93A4-70D30605B176}"/>
-              </a:ext>
-            </a:extLst>
-          </p:cNvPr>
+          <p:cNvPr id="2" name="Title 1"/>
           <p:cNvSpPr>
             <a:spLocks noGrp="1"/>
           </p:cNvSpPr>
@@ -2176,15 +2214,17 @@
         </p:nvSpPr>
         <p:spPr>
           <a:xfrm>
-            <a:off x="839788" y="457200"/>
-            <a:ext cx="3932237" cy="1600200"/>
+            <a:off x="841248" y="457200"/>
+            <a:ext cx="3200400" cy="1600197"/>
           </a:xfrm>
         </p:spPr>
         <p:txBody>
-          <a:bodyPr anchor="b"/>
+          <a:bodyPr anchor="b">
+            <a:normAutofit/>
+          </a:bodyPr>
           <a:lstStyle>
             <a:lvl1pPr>
-              <a:defRPr sz="3200"/>
+              <a:defRPr sz="3200" b="0" baseline="0"/>
             </a:lvl1pPr>
           </a:lstStyle>
           <a:p>
@@ -2192,18 +2232,13 @@
               <a:rPr lang="en-US"/>
               <a:t>Click to edit Master title style</a:t>
             </a:r>
-          </a:p>
-        </p:txBody>
-      </p:sp>
-      <p:sp>
-        <p:nvSpPr>
-          <p:cNvPr id="3" name="Content Placeholder 2">
-            <a:extLst>
-              <a:ext uri="{FF2B5EF4-FFF2-40B4-BE49-F238E27FC236}">
-                <a16:creationId xmlns:a16="http://schemas.microsoft.com/office/drawing/2014/main" id="{A3E26C44-25AE-48A5-A42C-BF0001B9895F}"/>
-              </a:ext>
-            </a:extLst>
-          </p:cNvPr>
+            <a:endParaRPr lang="en-US" dirty="0"/>
+          </a:p>
+        </p:txBody>
+      </p:sp>
+      <p:sp>
+        <p:nvSpPr>
+          <p:cNvPr id="3" name="Content Placeholder 2"/>
           <p:cNvSpPr>
             <a:spLocks noGrp="1"/>
           </p:cNvSpPr>
@@ -2213,39 +2248,39 @@
         </p:nvSpPr>
         <p:spPr>
           <a:xfrm>
-            <a:off x="5183188" y="987425"/>
-            <a:ext cx="6172200" cy="4873625"/>
+            <a:off x="4504267" y="685800"/>
+            <a:ext cx="6079066" cy="5486400"/>
           </a:xfrm>
         </p:spPr>
         <p:txBody>
           <a:bodyPr/>
           <a:lstStyle>
             <a:lvl1pPr>
-              <a:defRPr sz="3200"/>
+              <a:defRPr sz="2000"/>
             </a:lvl1pPr>
             <a:lvl2pPr>
-              <a:defRPr sz="2800"/>
+              <a:defRPr sz="1800"/>
             </a:lvl2pPr>
             <a:lvl3pPr>
-              <a:defRPr sz="2400"/>
+              <a:defRPr sz="1600"/>
             </a:lvl3pPr>
             <a:lvl4pPr>
-              <a:defRPr sz="2000"/>
+              <a:defRPr sz="1400"/>
             </a:lvl4pPr>
             <a:lvl5pPr>
-              <a:defRPr sz="2000"/>
+              <a:defRPr sz="1400"/>
             </a:lvl5pPr>
             <a:lvl6pPr>
-              <a:defRPr sz="2000"/>
+              <a:defRPr sz="1400"/>
             </a:lvl6pPr>
             <a:lvl7pPr>
-              <a:defRPr sz="2000"/>
+              <a:defRPr sz="1400"/>
             </a:lvl7pPr>
             <a:lvl8pPr>
-              <a:defRPr sz="2000"/>
+              <a:defRPr sz="1400"/>
             </a:lvl8pPr>
             <a:lvl9pPr>
-              <a:defRPr sz="2000"/>
+              <a:defRPr sz="1400"/>
             </a:lvl9pPr>
           </a:lstStyle>
           <a:p>
@@ -2282,18 +2317,13 @@
               <a:rPr lang="en-US"/>
               <a:t>Fifth level</a:t>
             </a:r>
-          </a:p>
-        </p:txBody>
-      </p:sp>
-      <p:sp>
-        <p:nvSpPr>
-          <p:cNvPr id="4" name="Text Placeholder 3">
-            <a:extLst>
-              <a:ext uri="{FF2B5EF4-FFF2-40B4-BE49-F238E27FC236}">
-                <a16:creationId xmlns:a16="http://schemas.microsoft.com/office/drawing/2014/main" id="{D85755F7-82BE-42C6-9563-DC7556642520}"/>
-              </a:ext>
-            </a:extLst>
-          </p:cNvPr>
+            <a:endParaRPr lang="en-US" dirty="0"/>
+          </a:p>
+        </p:txBody>
+      </p:sp>
+      <p:sp>
+        <p:nvSpPr>
+          <p:cNvPr id="4" name="Text Placeholder 3"/>
           <p:cNvSpPr>
             <a:spLocks noGrp="1"/>
           </p:cNvSpPr>
@@ -2303,48 +2333,56 @@
         </p:nvSpPr>
         <p:spPr>
           <a:xfrm>
-            <a:off x="839788" y="2057400"/>
-            <a:ext cx="3932237" cy="3811588"/>
+            <a:off x="841248" y="2099734"/>
+            <a:ext cx="3200400" cy="3810001"/>
           </a:xfrm>
         </p:spPr>
         <p:txBody>
-          <a:bodyPr/>
+          <a:bodyPr>
+            <a:normAutofit/>
+          </a:bodyPr>
           <a:lstStyle>
             <a:lvl1pPr marL="0" indent="0">
-              <a:buNone/>
-              <a:defRPr sz="1600"/>
+              <a:lnSpc>
+                <a:spcPct val="114000"/>
+              </a:lnSpc>
+              <a:spcBef>
+                <a:spcPts val="800"/>
+              </a:spcBef>
+              <a:buNone/>
+              <a:defRPr sz="1300"/>
             </a:lvl1pPr>
             <a:lvl2pPr marL="457200" indent="0">
               <a:buNone/>
-              <a:defRPr sz="1400"/>
+              <a:defRPr sz="1200"/>
             </a:lvl2pPr>
             <a:lvl3pPr marL="914400" indent="0">
               <a:buNone/>
-              <a:defRPr sz="1200"/>
+              <a:defRPr sz="1000"/>
             </a:lvl3pPr>
             <a:lvl4pPr marL="1371600" indent="0">
               <a:buNone/>
-              <a:defRPr sz="1000"/>
+              <a:defRPr sz="900"/>
             </a:lvl4pPr>
             <a:lvl5pPr marL="1828800" indent="0">
               <a:buNone/>
-              <a:defRPr sz="1000"/>
+              <a:defRPr sz="900"/>
             </a:lvl5pPr>
             <a:lvl6pPr marL="2286000" indent="0">
               <a:buNone/>
-              <a:defRPr sz="1000"/>
+              <a:defRPr sz="900"/>
             </a:lvl6pPr>
             <a:lvl7pPr marL="2743200" indent="0">
               <a:buNone/>
-              <a:defRPr sz="1000"/>
+              <a:defRPr sz="900"/>
             </a:lvl7pPr>
             <a:lvl8pPr marL="3200400" indent="0">
               <a:buNone/>
-              <a:defRPr sz="1000"/>
+              <a:defRPr sz="900"/>
             </a:lvl8pPr>
             <a:lvl9pPr marL="3657600" indent="0">
               <a:buNone/>
-              <a:defRPr sz="1000"/>
+              <a:defRPr sz="900"/>
             </a:lvl9pPr>
           </a:lstStyle>
           <a:p>
@@ -2358,13 +2396,7 @@
       </p:sp>
       <p:sp>
         <p:nvSpPr>
-          <p:cNvPr id="5" name="Date Placeholder 4">
-            <a:extLst>
-              <a:ext uri="{FF2B5EF4-FFF2-40B4-BE49-F238E27FC236}">
-                <a16:creationId xmlns:a16="http://schemas.microsoft.com/office/drawing/2014/main" id="{CD21EC79-69F5-4497-9381-C87F807DCDA0}"/>
-              </a:ext>
-            </a:extLst>
-          </p:cNvPr>
+          <p:cNvPr id="5" name="Date Placeholder 4"/>
           <p:cNvSpPr>
             <a:spLocks noGrp="1"/>
           </p:cNvSpPr>
@@ -2379,7 +2411,7 @@
           <a:p>
             <a:fld id="{471BB4B2-9036-4B80-8BF0-13DB295CF368}" type="datetimeFigureOut">
               <a:rPr lang="en-US" smtClean="0"/>
-              <a:t>2/26/2018</a:t>
+              <a:t>4/9/2018</a:t>
             </a:fld>
             <a:endParaRPr lang="en-US"/>
           </a:p>
@@ -2387,13 +2419,7 @@
       </p:sp>
       <p:sp>
         <p:nvSpPr>
-          <p:cNvPr id="6" name="Footer Placeholder 5">
-            <a:extLst>
-              <a:ext uri="{FF2B5EF4-FFF2-40B4-BE49-F238E27FC236}">
-                <a16:creationId xmlns:a16="http://schemas.microsoft.com/office/drawing/2014/main" id="{B6121792-D16D-4E39-865E-C15E3E4097F5}"/>
-              </a:ext>
-            </a:extLst>
-          </p:cNvPr>
+          <p:cNvPr id="6" name="Footer Placeholder 5"/>
           <p:cNvSpPr>
             <a:spLocks noGrp="1"/>
           </p:cNvSpPr>
@@ -2412,13 +2438,7 @@
       </p:sp>
       <p:sp>
         <p:nvSpPr>
-          <p:cNvPr id="7" name="Slide Number Placeholder 6">
-            <a:extLst>
-              <a:ext uri="{FF2B5EF4-FFF2-40B4-BE49-F238E27FC236}">
-                <a16:creationId xmlns:a16="http://schemas.microsoft.com/office/drawing/2014/main" id="{4DEE8F83-3195-461E-96AD-3414DF48ADDE}"/>
-              </a:ext>
-            </a:extLst>
-          </p:cNvPr>
+          <p:cNvPr id="7" name="Slide Number Placeholder 6"/>
           <p:cNvSpPr>
             <a:spLocks noGrp="1"/>
           </p:cNvSpPr>
@@ -2442,7 +2462,7 @@
     </p:spTree>
     <p:extLst>
       <p:ext uri="{BB962C8B-B14F-4D97-AF65-F5344CB8AC3E}">
-        <p14:creationId xmlns:p14="http://schemas.microsoft.com/office/powerpoint/2010/main" val="3488321928"/>
+        <p14:creationId xmlns:p14="http://schemas.microsoft.com/office/powerpoint/2010/main" val="2795864319"/>
       </p:ext>
     </p:extLst>
   </p:cSld>
@@ -2471,31 +2491,69 @@
       </p:grpSpPr>
       <p:sp>
         <p:nvSpPr>
-          <p:cNvPr id="2" name="Title 1">
-            <a:extLst>
-              <a:ext uri="{FF2B5EF4-FFF2-40B4-BE49-F238E27FC236}">
-                <a16:creationId xmlns:a16="http://schemas.microsoft.com/office/drawing/2014/main" id="{B796D33E-F782-4D05-AD53-0066E3DC23CE}"/>
-              </a:ext>
-            </a:extLst>
-          </p:cNvPr>
-          <p:cNvSpPr>
-            <a:spLocks noGrp="1"/>
-          </p:cNvSpPr>
-          <p:nvPr>
-            <p:ph type="title"/>
-          </p:nvPr>
+          <p:cNvPr id="8" name="Rectangle 7"/>
+          <p:cNvSpPr/>
+          <p:nvPr/>
         </p:nvSpPr>
         <p:spPr>
           <a:xfrm>
-            <a:off x="839788" y="457200"/>
-            <a:ext cx="3932237" cy="1600200"/>
+            <a:off x="0" y="5105400"/>
+            <a:ext cx="11292840" cy="1752600"/>
+          </a:xfrm>
+          <a:prstGeom prst="rect">
+            <a:avLst/>
+          </a:prstGeom>
+          <a:solidFill>
+            <a:srgbClr val="000000"/>
+          </a:solidFill>
+          <a:ln>
+            <a:noFill/>
+          </a:ln>
+        </p:spPr>
+        <p:style>
+          <a:lnRef idx="2">
+            <a:schemeClr val="accent1">
+              <a:shade val="50000"/>
+            </a:schemeClr>
+          </a:lnRef>
+          <a:fillRef idx="1">
+            <a:schemeClr val="accent1"/>
+          </a:fillRef>
+          <a:effectRef idx="0">
+            <a:schemeClr val="accent1"/>
+          </a:effectRef>
+          <a:fontRef idx="minor">
+            <a:schemeClr val="lt1"/>
+          </a:fontRef>
+        </p:style>
+      </p:sp>
+      <p:sp>
+        <p:nvSpPr>
+          <p:cNvPr id="2" name="Title 1"/>
+          <p:cNvSpPr>
+            <a:spLocks noGrp="1"/>
+          </p:cNvSpPr>
+          <p:nvPr>
+            <p:ph type="title"/>
+          </p:nvPr>
+        </p:nvSpPr>
+        <p:spPr>
+          <a:xfrm>
+            <a:off x="914400" y="5257800"/>
+            <a:ext cx="9982200" cy="914400"/>
           </a:xfrm>
         </p:spPr>
         <p:txBody>
-          <a:bodyPr anchor="b"/>
+          <a:bodyPr anchor="b">
+            <a:normAutofit/>
+          </a:bodyPr>
           <a:lstStyle>
             <a:lvl1pPr>
-              <a:defRPr sz="3200"/>
+              <a:defRPr sz="2800" b="0">
+                <a:solidFill>
+                  <a:schemeClr val="bg1"/>
+                </a:solidFill>
+              </a:defRPr>
             </a:lvl1pPr>
           </a:lstStyle>
           <a:p>
@@ -2503,20 +2561,15 @@
               <a:rPr lang="en-US"/>
               <a:t>Click to edit Master title style</a:t>
             </a:r>
-          </a:p>
-        </p:txBody>
-      </p:sp>
-      <p:sp>
-        <p:nvSpPr>
-          <p:cNvPr id="3" name="Picture Placeholder 2">
-            <a:extLst>
-              <a:ext uri="{FF2B5EF4-FFF2-40B4-BE49-F238E27FC236}">
-                <a16:creationId xmlns:a16="http://schemas.microsoft.com/office/drawing/2014/main" id="{22A92EFE-8DF0-48EE-80CA-41F609A0FA65}"/>
-              </a:ext>
-            </a:extLst>
-          </p:cNvPr>
-          <p:cNvSpPr>
-            <a:spLocks noGrp="1"/>
+            <a:endParaRPr lang="en-US" dirty="0"/>
+          </a:p>
+        </p:txBody>
+      </p:sp>
+      <p:sp>
+        <p:nvSpPr>
+          <p:cNvPr id="3" name="Picture Placeholder 2"/>
+          <p:cNvSpPr>
+            <a:spLocks noGrp="1" noChangeAspect="1"/>
           </p:cNvSpPr>
           <p:nvPr>
             <p:ph type="pic" idx="1"/>
@@ -2524,16 +2577,23 @@
         </p:nvSpPr>
         <p:spPr>
           <a:xfrm>
-            <a:off x="5183188" y="987425"/>
-            <a:ext cx="6172200" cy="4873625"/>
+            <a:off x="0" y="0"/>
+            <a:ext cx="11292840" cy="5128923"/>
           </a:xfrm>
+          <a:solidFill>
+            <a:schemeClr val="accent1"/>
+          </a:solidFill>
         </p:spPr>
         <p:txBody>
-          <a:bodyPr/>
+          <a:bodyPr anchor="t"/>
           <a:lstStyle>
             <a:lvl1pPr marL="0" indent="0">
               <a:buNone/>
-              <a:defRPr sz="3200"/>
+              <a:defRPr sz="3200">
+                <a:solidFill>
+                  <a:schemeClr val="bg1"/>
+                </a:solidFill>
+              </a:defRPr>
             </a:lvl1pPr>
             <a:lvl2pPr marL="457200" indent="0">
               <a:buNone/>
@@ -2569,19 +2629,17 @@
             </a:lvl9pPr>
           </a:lstStyle>
           <a:p>
-            <a:endParaRPr lang="en-US"/>
-          </a:p>
-        </p:txBody>
-      </p:sp>
-      <p:sp>
-        <p:nvSpPr>
-          <p:cNvPr id="4" name="Text Placeholder 3">
-            <a:extLst>
-              <a:ext uri="{FF2B5EF4-FFF2-40B4-BE49-F238E27FC236}">
-                <a16:creationId xmlns:a16="http://schemas.microsoft.com/office/drawing/2014/main" id="{721C5D90-A34B-4B58-8B9A-F33B6546D41A}"/>
-              </a:ext>
-            </a:extLst>
-          </p:cNvPr>
+            <a:r>
+              <a:rPr lang="en-US"/>
+              <a:t>Click icon to add picture</a:t>
+            </a:r>
+            <a:endParaRPr lang="en-US" dirty="0"/>
+          </a:p>
+        </p:txBody>
+      </p:sp>
+      <p:sp>
+        <p:nvSpPr>
+          <p:cNvPr id="4" name="Text Placeholder 3"/>
           <p:cNvSpPr>
             <a:spLocks noGrp="1"/>
           </p:cNvSpPr>
@@ -2591,48 +2649,62 @@
         </p:nvSpPr>
         <p:spPr>
           <a:xfrm>
-            <a:off x="839788" y="2057400"/>
-            <a:ext cx="3932237" cy="3811588"/>
+            <a:off x="914400" y="6108589"/>
+            <a:ext cx="9982200" cy="597011"/>
           </a:xfrm>
         </p:spPr>
         <p:txBody>
-          <a:bodyPr/>
+          <a:bodyPr>
+            <a:normAutofit/>
+          </a:bodyPr>
           <a:lstStyle>
             <a:lvl1pPr marL="0" indent="0">
-              <a:buNone/>
-              <a:defRPr sz="1600"/>
+              <a:lnSpc>
+                <a:spcPct val="100000"/>
+              </a:lnSpc>
+              <a:spcBef>
+                <a:spcPts val="800"/>
+              </a:spcBef>
+              <a:buNone/>
+              <a:defRPr sz="1300">
+                <a:solidFill>
+                  <a:schemeClr val="bg1">
+                    <a:lumMod val="85000"/>
+                  </a:schemeClr>
+                </a:solidFill>
+              </a:defRPr>
             </a:lvl1pPr>
             <a:lvl2pPr marL="457200" indent="0">
               <a:buNone/>
-              <a:defRPr sz="1400"/>
+              <a:defRPr sz="1200"/>
             </a:lvl2pPr>
             <a:lvl3pPr marL="914400" indent="0">
               <a:buNone/>
-              <a:defRPr sz="1200"/>
+              <a:defRPr sz="1000"/>
             </a:lvl3pPr>
             <a:lvl4pPr marL="1371600" indent="0">
               <a:buNone/>
-              <a:defRPr sz="1000"/>
+              <a:defRPr sz="900"/>
             </a:lvl4pPr>
             <a:lvl5pPr marL="1828800" indent="0">
               <a:buNone/>
-              <a:defRPr sz="1000"/>
+              <a:defRPr sz="900"/>
             </a:lvl5pPr>
             <a:lvl6pPr marL="2286000" indent="0">
               <a:buNone/>
-              <a:defRPr sz="1000"/>
+              <a:defRPr sz="900"/>
             </a:lvl6pPr>
             <a:lvl7pPr marL="2743200" indent="0">
               <a:buNone/>
-              <a:defRPr sz="1000"/>
+              <a:defRPr sz="900"/>
             </a:lvl7pPr>
             <a:lvl8pPr marL="3200400" indent="0">
               <a:buNone/>
-              <a:defRPr sz="1000"/>
+              <a:defRPr sz="900"/>
             </a:lvl8pPr>
             <a:lvl9pPr marL="3657600" indent="0">
               <a:buNone/>
-              <a:defRPr sz="1000"/>
+              <a:defRPr sz="900"/>
             </a:lvl9pPr>
           </a:lstStyle>
           <a:p>
@@ -2646,13 +2718,7 @@
       </p:sp>
       <p:sp>
         <p:nvSpPr>
-          <p:cNvPr id="5" name="Date Placeholder 4">
-            <a:extLst>
-              <a:ext uri="{FF2B5EF4-FFF2-40B4-BE49-F238E27FC236}">
-                <a16:creationId xmlns:a16="http://schemas.microsoft.com/office/drawing/2014/main" id="{4F7DB871-8C02-4422-B02F-B489FB6008CF}"/>
-              </a:ext>
-            </a:extLst>
-          </p:cNvPr>
+          <p:cNvPr id="5" name="Date Placeholder 4"/>
           <p:cNvSpPr>
             <a:spLocks noGrp="1"/>
           </p:cNvSpPr>
@@ -2667,7 +2733,7 @@
           <a:p>
             <a:fld id="{471BB4B2-9036-4B80-8BF0-13DB295CF368}" type="datetimeFigureOut">
               <a:rPr lang="en-US" smtClean="0"/>
-              <a:t>2/26/2018</a:t>
+              <a:t>4/9/2018</a:t>
             </a:fld>
             <a:endParaRPr lang="en-US"/>
           </a:p>
@@ -2675,13 +2741,7 @@
       </p:sp>
       <p:sp>
         <p:nvSpPr>
-          <p:cNvPr id="6" name="Footer Placeholder 5">
-            <a:extLst>
-              <a:ext uri="{FF2B5EF4-FFF2-40B4-BE49-F238E27FC236}">
-                <a16:creationId xmlns:a16="http://schemas.microsoft.com/office/drawing/2014/main" id="{33CFA32A-E7E1-4002-AE00-C3A42BE90747}"/>
-              </a:ext>
-            </a:extLst>
-          </p:cNvPr>
+          <p:cNvPr id="6" name="Footer Placeholder 5"/>
           <p:cNvSpPr>
             <a:spLocks noGrp="1"/>
           </p:cNvSpPr>
@@ -2700,13 +2760,7 @@
       </p:sp>
       <p:sp>
         <p:nvSpPr>
-          <p:cNvPr id="7" name="Slide Number Placeholder 6">
-            <a:extLst>
-              <a:ext uri="{FF2B5EF4-FFF2-40B4-BE49-F238E27FC236}">
-                <a16:creationId xmlns:a16="http://schemas.microsoft.com/office/drawing/2014/main" id="{906BFB6C-FF95-4A4D-A232-8D2F19043097}"/>
-              </a:ext>
-            </a:extLst>
-          </p:cNvPr>
+          <p:cNvPr id="7" name="Slide Number Placeholder 6"/>
           <p:cNvSpPr>
             <a:spLocks noGrp="1"/>
           </p:cNvSpPr>
@@ -2730,7 +2784,7 @@
     </p:spTree>
     <p:extLst>
       <p:ext uri="{BB962C8B-B14F-4D97-AF65-F5344CB8AC3E}">
-        <p14:creationId xmlns:p14="http://schemas.microsoft.com/office/powerpoint/2010/main" val="1433471514"/>
+        <p14:creationId xmlns:p14="http://schemas.microsoft.com/office/powerpoint/2010/main" val="4019428881"/>
       </p:ext>
     </p:extLst>
   </p:cSld>
@@ -2764,31 +2818,65 @@
       </p:grpSpPr>
       <p:sp>
         <p:nvSpPr>
-          <p:cNvPr id="2" name="Title Placeholder 1">
-            <a:extLst>
-              <a:ext uri="{FF2B5EF4-FFF2-40B4-BE49-F238E27FC236}">
-                <a16:creationId xmlns:a16="http://schemas.microsoft.com/office/drawing/2014/main" id="{4514657C-D83F-4A40-A7C6-415663EFBD76}"/>
-              </a:ext>
-            </a:extLst>
-          </p:cNvPr>
-          <p:cNvSpPr>
-            <a:spLocks noGrp="1"/>
-          </p:cNvSpPr>
-          <p:nvPr>
-            <p:ph type="title"/>
-          </p:nvPr>
+          <p:cNvPr id="7" name="Rectangle 6"/>
+          <p:cNvSpPr/>
+          <p:nvPr/>
         </p:nvSpPr>
         <p:spPr>
           <a:xfrm>
-            <a:off x="838200" y="365125"/>
-            <a:ext cx="10515600" cy="1325563"/>
+            <a:off x="11292840" y="0"/>
+            <a:ext cx="914400" cy="6858000"/>
+          </a:xfrm>
+          <a:prstGeom prst="rect">
+            <a:avLst/>
+          </a:prstGeom>
+          <a:solidFill>
+            <a:schemeClr val="tx2">
+              <a:lumMod val="75000"/>
+            </a:schemeClr>
+          </a:solidFill>
+          <a:ln>
+            <a:noFill/>
+          </a:ln>
+        </p:spPr>
+        <p:style>
+          <a:lnRef idx="2">
+            <a:schemeClr val="accent1">
+              <a:shade val="50000"/>
+            </a:schemeClr>
+          </a:lnRef>
+          <a:fillRef idx="1">
+            <a:schemeClr val="accent1"/>
+          </a:fillRef>
+          <a:effectRef idx="0">
+            <a:schemeClr val="accent1"/>
+          </a:effectRef>
+          <a:fontRef idx="minor">
+            <a:schemeClr val="lt1"/>
+          </a:fontRef>
+        </p:style>
+      </p:sp>
+      <p:sp>
+        <p:nvSpPr>
+          <p:cNvPr id="2" name="Title Placeholder 1"/>
+          <p:cNvSpPr>
+            <a:spLocks noGrp="1"/>
+          </p:cNvSpPr>
+          <p:nvPr>
+            <p:ph type="title"/>
+          </p:nvPr>
+        </p:nvSpPr>
+        <p:spPr>
+          <a:xfrm>
+            <a:off x="1261872" y="365760"/>
+            <a:ext cx="9692640" cy="1325562"/>
           </a:xfrm>
           <a:prstGeom prst="rect">
             <a:avLst/>
           </a:prstGeom>
         </p:spPr>
         <p:txBody>
-          <a:bodyPr vert="horz" lIns="91440" tIns="45720" rIns="91440" bIns="45720" rtlCol="0" anchor="ctr">
+          <a:bodyPr vert="horz" lIns="91440" tIns="45720" rIns="91440" bIns="45720" rtlCol="0" anchor="b">
             <a:normAutofit/>
           </a:bodyPr>
           <a:lstStyle/>
@@ -2797,18 +2885,13 @@
               <a:rPr lang="en-US"/>
               <a:t>Click to edit Master title style</a:t>
             </a:r>
-          </a:p>
-        </p:txBody>
-      </p:sp>
-      <p:sp>
-        <p:nvSpPr>
-          <p:cNvPr id="3" name="Text Placeholder 2">
-            <a:extLst>
-              <a:ext uri="{FF2B5EF4-FFF2-40B4-BE49-F238E27FC236}">
-                <a16:creationId xmlns:a16="http://schemas.microsoft.com/office/drawing/2014/main" id="{3DBD382E-1CCA-45E5-87E0-5FB215288BAF}"/>
-              </a:ext>
-            </a:extLst>
-          </p:cNvPr>
+            <a:endParaRPr lang="en-US" dirty="0"/>
+          </a:p>
+        </p:txBody>
+      </p:sp>
+      <p:sp>
+        <p:nvSpPr>
+          <p:cNvPr id="3" name="Text Placeholder 2"/>
           <p:cNvSpPr>
             <a:spLocks noGrp="1"/>
           </p:cNvSpPr>
@@ -2818,8 +2901,8 @@
         </p:nvSpPr>
         <p:spPr>
           <a:xfrm>
-            <a:off x="838200" y="1825625"/>
-            <a:ext cx="10515600" cy="4351338"/>
+            <a:off x="1261872" y="1828800"/>
+            <a:ext cx="8595360" cy="4351337"/>
           </a:xfrm>
           <a:prstGeom prst="rect">
             <a:avLst/>
@@ -2864,18 +2947,13 @@
               <a:rPr lang="en-US"/>
               <a:t>Fifth level</a:t>
             </a:r>
-          </a:p>
-        </p:txBody>
-      </p:sp>
-      <p:sp>
-        <p:nvSpPr>
-          <p:cNvPr id="4" name="Date Placeholder 3">
-            <a:extLst>
-              <a:ext uri="{FF2B5EF4-FFF2-40B4-BE49-F238E27FC236}">
-                <a16:creationId xmlns:a16="http://schemas.microsoft.com/office/drawing/2014/main" id="{6DA71567-6367-4102-AE4D-5ECEE3D611D1}"/>
-              </a:ext>
-            </a:extLst>
-          </p:cNvPr>
+            <a:endParaRPr lang="en-US" dirty="0"/>
+          </a:p>
+        </p:txBody>
+      </p:sp>
+      <p:sp>
+        <p:nvSpPr>
+          <p:cNvPr id="4" name="Date Placeholder 3"/>
           <p:cNvSpPr>
             <a:spLocks noGrp="1"/>
           </p:cNvSpPr>
@@ -2884,9 +2962,9 @@
           </p:nvPr>
         </p:nvSpPr>
         <p:spPr>
-          <a:xfrm>
-            <a:off x="838200" y="6356350"/>
-            <a:ext cx="2743200" cy="365125"/>
+          <a:xfrm rot="16200000">
+            <a:off x="10797542" y="998537"/>
+            <a:ext cx="1904999" cy="365125"/>
           </a:xfrm>
           <a:prstGeom prst="rect">
             <a:avLst/>
@@ -2895,11 +2973,12 @@
         <p:txBody>
           <a:bodyPr vert="horz" lIns="91440" tIns="45720" rIns="91440" bIns="45720" rtlCol="0" anchor="ctr"/>
           <a:lstStyle>
-            <a:lvl1pPr algn="l">
-              <a:defRPr sz="1200">
-                <a:solidFill>
-                  <a:schemeClr val="tx1">
-                    <a:tint val="75000"/>
+            <a:lvl1pPr algn="r">
+              <a:defRPr sz="1050" b="0">
+                <a:solidFill>
+                  <a:schemeClr val="tx2">
+                    <a:lumMod val="20000"/>
+                    <a:lumOff val="80000"/>
                   </a:schemeClr>
                 </a:solidFill>
               </a:defRPr>
@@ -2908,7 +2987,7 @@
           <a:p>
             <a:fld id="{471BB4B2-9036-4B80-8BF0-13DB295CF368}" type="datetimeFigureOut">
               <a:rPr lang="en-US" smtClean="0"/>
-              <a:t>2/26/2018</a:t>
+              <a:t>4/9/2018</a:t>
             </a:fld>
             <a:endParaRPr lang="en-US"/>
           </a:p>
@@ -2916,13 +2995,7 @@
       </p:sp>
       <p:sp>
         <p:nvSpPr>
-          <p:cNvPr id="5" name="Footer Placeholder 4">
-            <a:extLst>
-              <a:ext uri="{FF2B5EF4-FFF2-40B4-BE49-F238E27FC236}">
-                <a16:creationId xmlns:a16="http://schemas.microsoft.com/office/drawing/2014/main" id="{8470197D-A477-4796-8E1D-4003A766D059}"/>
-              </a:ext>
-            </a:extLst>
-          </p:cNvPr>
+          <p:cNvPr id="5" name="Footer Placeholder 4"/>
           <p:cNvSpPr>
             <a:spLocks noGrp="1"/>
           </p:cNvSpPr>
@@ -2931,9 +3004,9 @@
           </p:nvPr>
         </p:nvSpPr>
         <p:spPr>
-          <a:xfrm>
-            <a:off x="4038600" y="6356350"/>
-            <a:ext cx="4114800" cy="365125"/>
+          <a:xfrm rot="16200000">
+            <a:off x="9959341" y="4046537"/>
+            <a:ext cx="3581400" cy="365125"/>
           </a:xfrm>
           <a:prstGeom prst="rect">
             <a:avLst/>
@@ -2942,11 +3015,12 @@
         <p:txBody>
           <a:bodyPr vert="horz" lIns="91440" tIns="45720" rIns="91440" bIns="45720" rtlCol="0" anchor="ctr"/>
           <a:lstStyle>
-            <a:lvl1pPr algn="ctr">
-              <a:defRPr sz="1200">
-                <a:solidFill>
-                  <a:schemeClr val="tx1">
-                    <a:tint val="75000"/>
+            <a:lvl1pPr algn="l">
+              <a:defRPr sz="1050">
+                <a:solidFill>
+                  <a:schemeClr val="tx2">
+                    <a:lumMod val="20000"/>
+                    <a:lumOff val="80000"/>
                   </a:schemeClr>
                 </a:solidFill>
               </a:defRPr>
@@ -2959,13 +3033,7 @@
       </p:sp>
       <p:sp>
         <p:nvSpPr>
-          <p:cNvPr id="6" name="Slide Number Placeholder 5">
-            <a:extLst>
-              <a:ext uri="{FF2B5EF4-FFF2-40B4-BE49-F238E27FC236}">
-                <a16:creationId xmlns:a16="http://schemas.microsoft.com/office/drawing/2014/main" id="{AF39D481-F557-4836-B912-3F705CFC4036}"/>
-              </a:ext>
-            </a:extLst>
-          </p:cNvPr>
+          <p:cNvPr id="6" name="Slide Number Placeholder 5"/>
           <p:cNvSpPr>
             <a:spLocks noGrp="1"/>
           </p:cNvSpPr>
@@ -2975,21 +3043,24 @@
         </p:nvSpPr>
         <p:spPr>
           <a:xfrm>
-            <a:off x="8610600" y="6356350"/>
-            <a:ext cx="2743200" cy="365125"/>
+            <a:off x="11292840" y="6172200"/>
+            <a:ext cx="914400" cy="593725"/>
           </a:xfrm>
           <a:prstGeom prst="rect">
             <a:avLst/>
           </a:prstGeom>
         </p:spPr>
         <p:txBody>
-          <a:bodyPr vert="horz" lIns="91440" tIns="45720" rIns="91440" bIns="45720" rtlCol="0" anchor="ctr"/>
+          <a:bodyPr vert="horz" lIns="45720" tIns="45720" rIns="45720" bIns="45720" rtlCol="0" anchor="ctr">
+            <a:normAutofit/>
+          </a:bodyPr>
           <a:lstStyle>
-            <a:lvl1pPr algn="r">
-              <a:defRPr sz="1200">
-                <a:solidFill>
-                  <a:schemeClr val="tx1">
-                    <a:tint val="75000"/>
+            <a:lvl1pPr algn="ctr">
+              <a:defRPr sz="3600">
+                <a:solidFill>
+                  <a:schemeClr val="tx2">
+                    <a:lumMod val="60000"/>
+                    <a:lumOff val="40000"/>
                   </a:schemeClr>
                 </a:solidFill>
               </a:defRPr>
@@ -3007,23 +3078,23 @@
     </p:spTree>
     <p:extLst>
       <p:ext uri="{BB962C8B-B14F-4D97-AF65-F5344CB8AC3E}">
-        <p14:creationId xmlns:p14="http://schemas.microsoft.com/office/powerpoint/2010/main" val="1445625569"/>
+        <p14:creationId xmlns:p14="http://schemas.microsoft.com/office/powerpoint/2010/main" val="2014226205"/>
       </p:ext>
     </p:extLst>
   </p:cSld>
   <p:clrMap bg1="lt1" tx1="dk1" bg2="lt2" tx2="dk2" accent1="accent1" accent2="accent2" accent3="accent3" accent4="accent4" accent5="accent5" accent6="accent6" hlink="hlink" folHlink="folHlink"/>
   <p:sldLayoutIdLst>
-    <p:sldLayoutId id="2147483649" r:id="rId1"/>
-    <p:sldLayoutId id="2147483650" r:id="rId2"/>
-    <p:sldLayoutId id="2147483651" r:id="rId3"/>
-    <p:sldLayoutId id="2147483652" r:id="rId4"/>
-    <p:sldLayoutId id="2147483653" r:id="rId5"/>
-    <p:sldLayoutId id="2147483654" r:id="rId6"/>
-    <p:sldLayoutId id="2147483655" r:id="rId7"/>
-    <p:sldLayoutId id="2147483656" r:id="rId8"/>
-    <p:sldLayoutId id="2147483657" r:id="rId9"/>
-    <p:sldLayoutId id="2147483658" r:id="rId10"/>
-    <p:sldLayoutId id="2147483659" r:id="rId11"/>
+    <p:sldLayoutId id="2147483960" r:id="rId1"/>
+    <p:sldLayoutId id="2147483961" r:id="rId2"/>
+    <p:sldLayoutId id="2147483962" r:id="rId3"/>
+    <p:sldLayoutId id="2147483963" r:id="rId4"/>
+    <p:sldLayoutId id="2147483964" r:id="rId5"/>
+    <p:sldLayoutId id="2147483965" r:id="rId6"/>
+    <p:sldLayoutId id="2147483966" r:id="rId7"/>
+    <p:sldLayoutId id="2147483967" r:id="rId8"/>
+    <p:sldLayoutId id="2147483968" r:id="rId9"/>
+    <p:sldLayoutId id="2147483969" r:id="rId10"/>
+    <p:sldLayoutId id="2147483970" r:id="rId11"/>
   </p:sldLayoutIdLst>
   <p:txStyles>
     <p:titleStyle>
@@ -3035,7 +3106,7 @@
           <a:spcPct val="0"/>
         </a:spcBef>
         <a:buNone/>
-        <a:defRPr sz="4400" kern="1200">
+        <a:defRPr sz="4400" kern="1200" spc="-50" baseline="0">
           <a:solidFill>
             <a:schemeClr val="tx1"/>
           </a:solidFill>
@@ -3046,16 +3117,23 @@
       </a:lvl1pPr>
     </p:titleStyle>
     <p:bodyStyle>
-      <a:lvl1pPr marL="228600" indent="-228600" algn="l" defTabSz="914400" rtl="0" eaLnBrk="1" latinLnBrk="0" hangingPunct="1">
+      <a:lvl1pPr marL="182880" indent="-182880" algn="l" defTabSz="914400" rtl="0" eaLnBrk="1" latinLnBrk="0" hangingPunct="1">
         <a:lnSpc>
-          <a:spcPct val="90000"/>
+          <a:spcPct val="95000"/>
         </a:lnSpc>
         <a:spcBef>
-          <a:spcPts val="1000"/>
+          <a:spcPts val="1400"/>
         </a:spcBef>
-        <a:buFont typeface="Arial" panose="020B0604020202020204" pitchFamily="34" charset="0"/>
+        <a:spcAft>
+          <a:spcPts val="200"/>
+        </a:spcAft>
+        <a:buClr>
+          <a:schemeClr val="accent1"/>
+        </a:buClr>
+        <a:buSzPct val="80000"/>
+        <a:buFont typeface="Arial" pitchFamily="34" charset="0"/>
         <a:buChar char="•"/>
-        <a:defRPr sz="2800" kern="1200">
+        <a:defRPr sz="1800" kern="1200" spc="10" baseline="0">
           <a:solidFill>
             <a:schemeClr val="tx1"/>
           </a:solidFill>
@@ -3064,144 +3142,216 @@
           <a:cs typeface="+mn-cs"/>
         </a:defRPr>
       </a:lvl1pPr>
-      <a:lvl2pPr marL="685800" indent="-228600" algn="l" defTabSz="914400" rtl="0" eaLnBrk="1" latinLnBrk="0" hangingPunct="1">
+      <a:lvl2pPr marL="457200" indent="-182880" algn="l" defTabSz="914400" rtl="0" eaLnBrk="1" latinLnBrk="0" hangingPunct="1">
         <a:lnSpc>
           <a:spcPct val="90000"/>
         </a:lnSpc>
         <a:spcBef>
-          <a:spcPts val="500"/>
+          <a:spcPts val="300"/>
         </a:spcBef>
-        <a:buFont typeface="Arial" panose="020B0604020202020204" pitchFamily="34" charset="0"/>
-        <a:buChar char="•"/>
-        <a:defRPr sz="2400" kern="1200">
+        <a:spcAft>
+          <a:spcPts val="300"/>
+        </a:spcAft>
+        <a:buClr>
+          <a:schemeClr val="accent1"/>
+        </a:buClr>
+        <a:buFont typeface="Wingdings 2" pitchFamily="18" charset="2"/>
+        <a:buChar char=""/>
+        <a:defRPr sz="1600" kern="1200">
           <a:solidFill>
-            <a:schemeClr val="tx1"/>
+            <a:schemeClr val="tx1">
+              <a:lumMod val="85000"/>
+              <a:lumOff val="15000"/>
+            </a:schemeClr>
           </a:solidFill>
           <a:latin typeface="+mn-lt"/>
           <a:ea typeface="+mn-ea"/>
           <a:cs typeface="+mn-cs"/>
         </a:defRPr>
       </a:lvl2pPr>
-      <a:lvl3pPr marL="1143000" indent="-228600" algn="l" defTabSz="914400" rtl="0" eaLnBrk="1" latinLnBrk="0" hangingPunct="1">
+      <a:lvl3pPr marL="731520" indent="-182880" algn="l" defTabSz="914400" rtl="0" eaLnBrk="1" latinLnBrk="0" hangingPunct="1">
         <a:lnSpc>
           <a:spcPct val="90000"/>
         </a:lnSpc>
         <a:spcBef>
-          <a:spcPts val="500"/>
+          <a:spcPts val="300"/>
         </a:spcBef>
-        <a:buFont typeface="Arial" panose="020B0604020202020204" pitchFamily="34" charset="0"/>
-        <a:buChar char="•"/>
-        <a:defRPr sz="2000" kern="1200">
+        <a:spcAft>
+          <a:spcPts val="300"/>
+        </a:spcAft>
+        <a:buClr>
+          <a:schemeClr val="accent1"/>
+        </a:buClr>
+        <a:buFont typeface="Wingdings 2" pitchFamily="18" charset="2"/>
+        <a:buChar char=""/>
+        <a:defRPr sz="1400" kern="1200">
           <a:solidFill>
-            <a:schemeClr val="tx1"/>
+            <a:schemeClr val="tx1">
+              <a:lumMod val="85000"/>
+              <a:lumOff val="15000"/>
+            </a:schemeClr>
           </a:solidFill>
           <a:latin typeface="+mn-lt"/>
           <a:ea typeface="+mn-ea"/>
           <a:cs typeface="+mn-cs"/>
         </a:defRPr>
       </a:lvl3pPr>
-      <a:lvl4pPr marL="1600200" indent="-228600" algn="l" defTabSz="914400" rtl="0" eaLnBrk="1" latinLnBrk="0" hangingPunct="1">
+      <a:lvl4pPr marL="1005840" indent="-182880" algn="l" defTabSz="914400" rtl="0" eaLnBrk="1" latinLnBrk="0" hangingPunct="1">
         <a:lnSpc>
           <a:spcPct val="90000"/>
         </a:lnSpc>
         <a:spcBef>
-          <a:spcPts val="500"/>
+          <a:spcPts val="300"/>
         </a:spcBef>
-        <a:buFont typeface="Arial" panose="020B0604020202020204" pitchFamily="34" charset="0"/>
-        <a:buChar char="•"/>
-        <a:defRPr sz="1800" kern="1200">
+        <a:spcAft>
+          <a:spcPts val="300"/>
+        </a:spcAft>
+        <a:buClr>
+          <a:schemeClr val="accent1"/>
+        </a:buClr>
+        <a:buFont typeface="Wingdings 2" pitchFamily="18" charset="2"/>
+        <a:buChar char=""/>
+        <a:defRPr sz="1400" kern="1200">
           <a:solidFill>
-            <a:schemeClr val="tx1"/>
+            <a:schemeClr val="tx1">
+              <a:lumMod val="85000"/>
+              <a:lumOff val="15000"/>
+            </a:schemeClr>
           </a:solidFill>
           <a:latin typeface="+mn-lt"/>
           <a:ea typeface="+mn-ea"/>
           <a:cs typeface="+mn-cs"/>
         </a:defRPr>
       </a:lvl4pPr>
-      <a:lvl5pPr marL="2057400" indent="-228600" algn="l" defTabSz="914400" rtl="0" eaLnBrk="1" latinLnBrk="0" hangingPunct="1">
+      <a:lvl5pPr marL="1280160" indent="-182880" algn="l" defTabSz="914400" rtl="0" eaLnBrk="1" latinLnBrk="0" hangingPunct="1">
         <a:lnSpc>
           <a:spcPct val="90000"/>
         </a:lnSpc>
         <a:spcBef>
-          <a:spcPts val="500"/>
+          <a:spcPts val="300"/>
         </a:spcBef>
-        <a:buFont typeface="Arial" panose="020B0604020202020204" pitchFamily="34" charset="0"/>
-        <a:buChar char="•"/>
-        <a:defRPr sz="1800" kern="1200">
+        <a:spcAft>
+          <a:spcPts val="300"/>
+        </a:spcAft>
+        <a:buClr>
+          <a:schemeClr val="accent1"/>
+        </a:buClr>
+        <a:buFont typeface="Wingdings 2" pitchFamily="18" charset="2"/>
+        <a:buChar char=""/>
+        <a:defRPr sz="1400" kern="1200">
           <a:solidFill>
-            <a:schemeClr val="tx1"/>
+            <a:schemeClr val="tx1">
+              <a:lumMod val="85000"/>
+              <a:lumOff val="15000"/>
+            </a:schemeClr>
           </a:solidFill>
           <a:latin typeface="+mn-lt"/>
           <a:ea typeface="+mn-ea"/>
           <a:cs typeface="+mn-cs"/>
         </a:defRPr>
       </a:lvl5pPr>
-      <a:lvl6pPr marL="2514600" indent="-228600" algn="l" defTabSz="914400" rtl="0" eaLnBrk="1" latinLnBrk="0" hangingPunct="1">
+      <a:lvl6pPr marL="1600000" indent="-228600" algn="l" defTabSz="914400" rtl="0" eaLnBrk="1" latinLnBrk="0" hangingPunct="1">
         <a:lnSpc>
           <a:spcPct val="90000"/>
         </a:lnSpc>
         <a:spcBef>
-          <a:spcPts val="500"/>
+          <a:spcPts val="300"/>
         </a:spcBef>
-        <a:buFont typeface="Arial" panose="020B0604020202020204" pitchFamily="34" charset="0"/>
-        <a:buChar char="•"/>
-        <a:defRPr sz="1800" kern="1200">
+        <a:spcAft>
+          <a:spcPts val="300"/>
+        </a:spcAft>
+        <a:buClr>
+          <a:schemeClr val="accent1"/>
+        </a:buClr>
+        <a:buFont typeface="Wingdings 2" pitchFamily="18" charset="2"/>
+        <a:buChar char=""/>
+        <a:defRPr sz="1400" kern="1200">
           <a:solidFill>
-            <a:schemeClr val="tx1"/>
+            <a:schemeClr val="tx1">
+              <a:lumMod val="85000"/>
+              <a:lumOff val="15000"/>
+            </a:schemeClr>
           </a:solidFill>
           <a:latin typeface="+mn-lt"/>
           <a:ea typeface="+mn-ea"/>
           <a:cs typeface="+mn-cs"/>
         </a:defRPr>
       </a:lvl6pPr>
-      <a:lvl7pPr marL="2971800" indent="-228600" algn="l" defTabSz="914400" rtl="0" eaLnBrk="1" latinLnBrk="0" hangingPunct="1">
+      <a:lvl7pPr marL="1900000" indent="-228600" algn="l" defTabSz="914400" rtl="0" eaLnBrk="1" latinLnBrk="0" hangingPunct="1">
         <a:lnSpc>
           <a:spcPct val="90000"/>
         </a:lnSpc>
         <a:spcBef>
-          <a:spcPts val="500"/>
+          <a:spcPts val="300"/>
         </a:spcBef>
-        <a:buFont typeface="Arial" panose="020B0604020202020204" pitchFamily="34" charset="0"/>
-        <a:buChar char="•"/>
-        <a:defRPr sz="1800" kern="1200">
+        <a:spcAft>
+          <a:spcPts val="300"/>
+        </a:spcAft>
+        <a:buClr>
+          <a:schemeClr val="accent1"/>
+        </a:buClr>
+        <a:buFont typeface="Wingdings 2" pitchFamily="18" charset="2"/>
+        <a:buChar char=""/>
+        <a:defRPr sz="1400" kern="1200">
           <a:solidFill>
-            <a:schemeClr val="tx1"/>
+            <a:schemeClr val="tx1">
+              <a:lumMod val="85000"/>
+              <a:lumOff val="15000"/>
+            </a:schemeClr>
           </a:solidFill>
           <a:latin typeface="+mn-lt"/>
           <a:ea typeface="+mn-ea"/>
           <a:cs typeface="+mn-cs"/>
         </a:defRPr>
       </a:lvl7pPr>
-      <a:lvl8pPr marL="3429000" indent="-228600" algn="l" defTabSz="914400" rtl="0" eaLnBrk="1" latinLnBrk="0" hangingPunct="1">
+      <a:lvl8pPr marL="2200000" indent="-228600" algn="l" defTabSz="914400" rtl="0" eaLnBrk="1" latinLnBrk="0" hangingPunct="1">
         <a:lnSpc>
           <a:spcPct val="90000"/>
         </a:lnSpc>
         <a:spcBef>
-          <a:spcPts val="500"/>
+          <a:spcPts val="300"/>
         </a:spcBef>
-        <a:buFont typeface="Arial" panose="020B0604020202020204" pitchFamily="34" charset="0"/>
-        <a:buChar char="•"/>
-        <a:defRPr sz="1800" kern="1200">
+        <a:spcAft>
+          <a:spcPts val="300"/>
+        </a:spcAft>
+        <a:buClr>
+          <a:schemeClr val="accent1"/>
+        </a:buClr>
+        <a:buFont typeface="Wingdings 2" pitchFamily="18" charset="2"/>
+        <a:buChar char=""/>
+        <a:defRPr sz="1400" kern="1200">
           <a:solidFill>
-            <a:schemeClr val="tx1"/>
+            <a:schemeClr val="tx1">
+              <a:lumMod val="85000"/>
+              <a:lumOff val="15000"/>
+            </a:schemeClr>
           </a:solidFill>
           <a:latin typeface="+mn-lt"/>
           <a:ea typeface="+mn-ea"/>
           <a:cs typeface="+mn-cs"/>
         </a:defRPr>
       </a:lvl8pPr>
-      <a:lvl9pPr marL="3886200" indent="-228600" algn="l" defTabSz="914400" rtl="0" eaLnBrk="1" latinLnBrk="0" hangingPunct="1">
+      <a:lvl9pPr marL="2500000" indent="-228600" algn="l" defTabSz="914400" rtl="0" eaLnBrk="1" latinLnBrk="0" hangingPunct="1">
         <a:lnSpc>
           <a:spcPct val="90000"/>
         </a:lnSpc>
         <a:spcBef>
-          <a:spcPts val="500"/>
+          <a:spcPts val="300"/>
         </a:spcBef>
-        <a:buFont typeface="Arial" panose="020B0604020202020204" pitchFamily="34" charset="0"/>
-        <a:buChar char="•"/>
-        <a:defRPr sz="1800" kern="1200">
+        <a:spcAft>
+          <a:spcPts val="300"/>
+        </a:spcAft>
+        <a:buClr>
+          <a:schemeClr val="accent1"/>
+        </a:buClr>
+        <a:buFont typeface="Wingdings 2" pitchFamily="18" charset="2"/>
+        <a:buChar char=""/>
+        <a:defRPr sz="1400" kern="1200">
           <a:solidFill>
-            <a:schemeClr val="tx1"/>
+            <a:schemeClr val="tx1">
+              <a:lumMod val="85000"/>
+              <a:lumOff val="15000"/>
+            </a:schemeClr>
           </a:solidFill>
           <a:latin typeface="+mn-lt"/>
           <a:ea typeface="+mn-ea"/>
@@ -3305,6 +3455,11 @@
       </a:lvl9pPr>
     </p:otherStyle>
   </p:txStyles>
+  <p:extLst>
+    <p:ext uri="{27BBF7A9-308A-43DC-89C8-2F10F3537804}">
+      <p15:sldGuideLst xmlns:p15="http://schemas.microsoft.com/office/powerpoint/2012/main"/>
+    </p:ext>
+  </p:extLst>
 </p:sldMaster>
 </file>
 
@@ -3343,7 +3498,9 @@
         </p:nvSpPr>
         <p:spPr/>
         <p:txBody>
-          <a:bodyPr/>
+          <a:bodyPr>
+            <a:normAutofit/>
+          </a:bodyPr>
           <a:lstStyle/>
           <a:p>
             <a:r>
@@ -3385,31 +3542,6 @@
       </p:grpSpPr>
       <p:sp>
         <p:nvSpPr>
-          <p:cNvPr id="2" name="Title 1">
-            <a:extLst>
-              <a:ext uri="{FF2B5EF4-FFF2-40B4-BE49-F238E27FC236}">
-                <a16:creationId xmlns:a16="http://schemas.microsoft.com/office/drawing/2014/main" id="{C81ACFE1-2F73-421A-AFAB-081139E2DD9F}"/>
-              </a:ext>
-            </a:extLst>
-          </p:cNvPr>
-          <p:cNvSpPr>
-            <a:spLocks noGrp="1"/>
-          </p:cNvSpPr>
-          <p:nvPr>
-            <p:ph type="title"/>
-          </p:nvPr>
-        </p:nvSpPr>
-        <p:spPr/>
-        <p:txBody>
-          <a:bodyPr/>
-          <a:lstStyle/>
-          <a:p>
-            <a:endParaRPr lang="en-US"/>
-          </a:p>
-        </p:txBody>
-      </p:sp>
-      <p:sp>
-        <p:nvSpPr>
           <p:cNvPr id="3" name="Content Placeholder 2">
             <a:extLst>
               <a:ext uri="{FF2B5EF4-FFF2-40B4-BE49-F238E27FC236}">
@@ -3432,6 +3564,21 @@
             <a:r>
               <a:rPr lang="en-US" dirty="0"/>
               <a:t>BAMULESEYO GIDEON</a:t>
+            </a:r>
+          </a:p>
+          <a:p>
+            <a:r>
+              <a:rPr lang="en-US" dirty="0">
+                <a:hlinkClick r:id="rId2"/>
+              </a:rPr>
+              <a:t>gideonbamuleseyo@gmail.com</a:t>
+            </a:r>
+            <a:endParaRPr lang="en-US" dirty="0"/>
+          </a:p>
+          <a:p>
+            <a:r>
+              <a:rPr lang="en-US" dirty="0"/>
+              <a:t>https://github.com/lytes20</a:t>
             </a:r>
           </a:p>
         </p:txBody>
@@ -3484,7 +3631,9 @@
         </p:nvSpPr>
         <p:spPr/>
         <p:txBody>
-          <a:bodyPr/>
+          <a:bodyPr>
+            <a:normAutofit/>
+          </a:bodyPr>
           <a:lstStyle/>
           <a:p>
             <a:r>
@@ -3524,7 +3673,16 @@
             </a:r>
             <a:r>
               <a:rPr lang="en-US" dirty="0"/>
-              <a:t> In this module, participants will be introduced to the web stack and programming concepts.</a:t>
+              <a:t> </a:t>
+            </a:r>
+          </a:p>
+          <a:p>
+            <a:pPr marL="0" indent="0">
+              <a:buNone/>
+            </a:pPr>
+            <a:r>
+              <a:rPr lang="en-US" dirty="0"/>
+              <a:t>Intro to the web stack and programming concepts.</a:t>
             </a:r>
           </a:p>
           <a:p>
@@ -3613,7 +3771,9 @@
         </p:nvSpPr>
         <p:spPr/>
         <p:txBody>
-          <a:bodyPr/>
+          <a:bodyPr>
+            <a:normAutofit/>
+          </a:bodyPr>
           <a:lstStyle/>
           <a:p>
             <a:pPr algn="ctr"/>
@@ -3775,7 +3935,7 @@
         <p:spPr/>
         <p:txBody>
           <a:bodyPr>
-            <a:normAutofit lnSpcReduction="10000"/>
+            <a:normAutofit/>
           </a:bodyPr>
           <a:lstStyle/>
           <a:p>
@@ -4262,10 +4422,395 @@
 </p:sld>
 </file>
 
+<file path=ppt/slides/slide6.xml><?xml version="1.0" encoding="utf-8"?>
+<p:sld xmlns:a="http://schemas.openxmlformats.org/drawingml/2006/main" xmlns:r="http://schemas.openxmlformats.org/officeDocument/2006/relationships" xmlns:p="http://schemas.openxmlformats.org/presentationml/2006/main">
+  <p:cSld>
+    <p:spTree>
+      <p:nvGrpSpPr>
+        <p:cNvPr id="1" name=""/>
+        <p:cNvGrpSpPr/>
+        <p:nvPr/>
+      </p:nvGrpSpPr>
+      <p:grpSpPr>
+        <a:xfrm>
+          <a:off x="0" y="0"/>
+          <a:ext cx="0" cy="0"/>
+          <a:chOff x="0" y="0"/>
+          <a:chExt cx="0" cy="0"/>
+        </a:xfrm>
+      </p:grpSpPr>
+      <p:sp>
+        <p:nvSpPr>
+          <p:cNvPr id="2" name="Title 1">
+            <a:extLst>
+              <a:ext uri="{FF2B5EF4-FFF2-40B4-BE49-F238E27FC236}">
+                <a16:creationId xmlns:a16="http://schemas.microsoft.com/office/drawing/2014/main" id="{177675DC-C096-40CF-9DD4-EC117253326B}"/>
+              </a:ext>
+            </a:extLst>
+          </p:cNvPr>
+          <p:cNvSpPr>
+            <a:spLocks noGrp="1"/>
+          </p:cNvSpPr>
+          <p:nvPr>
+            <p:ph type="title"/>
+          </p:nvPr>
+        </p:nvSpPr>
+        <p:spPr/>
+        <p:txBody>
+          <a:bodyPr/>
+          <a:lstStyle/>
+          <a:p>
+            <a:r>
+              <a:rPr lang="en-US" dirty="0"/>
+              <a:t>HTML ELEMENTS</a:t>
+            </a:r>
+          </a:p>
+        </p:txBody>
+      </p:sp>
+      <p:sp>
+        <p:nvSpPr>
+          <p:cNvPr id="3" name="Content Placeholder 2">
+            <a:extLst>
+              <a:ext uri="{FF2B5EF4-FFF2-40B4-BE49-F238E27FC236}">
+                <a16:creationId xmlns:a16="http://schemas.microsoft.com/office/drawing/2014/main" id="{6B9475A0-F8B9-4288-896E-31FCB2EBAF22}"/>
+              </a:ext>
+            </a:extLst>
+          </p:cNvPr>
+          <p:cNvSpPr>
+            <a:spLocks noGrp="1"/>
+          </p:cNvSpPr>
+          <p:nvPr>
+            <p:ph idx="1"/>
+          </p:nvPr>
+        </p:nvSpPr>
+        <p:spPr/>
+        <p:txBody>
+          <a:bodyPr>
+            <a:normAutofit/>
+          </a:bodyPr>
+          <a:lstStyle/>
+          <a:p>
+            <a:r>
+              <a:rPr lang="en-US" dirty="0"/>
+              <a:t>&lt;</a:t>
+            </a:r>
+            <a:r>
+              <a:rPr lang="en-US" dirty="0" err="1"/>
+              <a:t>tagname</a:t>
+            </a:r>
+            <a:r>
+              <a:rPr lang="en-US" dirty="0"/>
+              <a:t>&gt;Content goes here...&lt;/</a:t>
+            </a:r>
+            <a:r>
+              <a:rPr lang="en-US" dirty="0" err="1"/>
+              <a:t>tagname</a:t>
+            </a:r>
+            <a:r>
+              <a:rPr lang="en-US" dirty="0"/>
+              <a:t>&gt;</a:t>
+            </a:r>
+          </a:p>
+          <a:p>
+            <a:pPr marL="0" indent="0">
+              <a:buNone/>
+            </a:pPr>
+            <a:r>
+              <a:rPr lang="en-US" dirty="0"/>
+              <a:t>Example</a:t>
+            </a:r>
+          </a:p>
+          <a:p>
+            <a:r>
+              <a:rPr lang="en-US" dirty="0"/>
+              <a:t>&lt;p&gt;My first paragraph.&lt;/p&gt;</a:t>
+            </a:r>
+          </a:p>
+          <a:p>
+            <a:r>
+              <a:rPr lang="en-US" dirty="0"/>
+              <a:t>&lt;h1&gt;My First Heading&lt;/h1&gt;</a:t>
+            </a:r>
+          </a:p>
+          <a:p>
+            <a:pPr marL="0" indent="0">
+              <a:buNone/>
+            </a:pPr>
+            <a:r>
+              <a:rPr lang="en-US" u="sng" dirty="0"/>
+              <a:t>Nested HTML Elements</a:t>
+            </a:r>
+          </a:p>
+          <a:p>
+            <a:r>
+              <a:rPr lang="en-US" dirty="0"/>
+              <a:t>&lt;h1&gt;&lt;a </a:t>
+            </a:r>
+            <a:r>
+              <a:rPr lang="en-US" dirty="0" err="1"/>
+              <a:t>href</a:t>
+            </a:r>
+            <a:r>
+              <a:rPr lang="en-US" dirty="0"/>
+              <a:t>=“”&gt;My Heading&lt;/a&gt;&lt;h1&gt;</a:t>
+            </a:r>
+          </a:p>
+          <a:p>
+            <a:pPr marL="0" indent="0">
+              <a:buNone/>
+            </a:pPr>
+            <a:r>
+              <a:rPr lang="en-US" u="sng" dirty="0"/>
+              <a:t>Empty HTML Elements</a:t>
+            </a:r>
+          </a:p>
+          <a:p>
+            <a:r>
+              <a:rPr lang="en-US" dirty="0"/>
+              <a:t>&lt;</a:t>
+            </a:r>
+            <a:r>
+              <a:rPr lang="en-US" dirty="0" err="1"/>
+              <a:t>br</a:t>
+            </a:r>
+            <a:r>
+              <a:rPr lang="en-US" dirty="0"/>
+              <a:t>&gt;</a:t>
+            </a:r>
+          </a:p>
+          <a:p>
+            <a:r>
+              <a:rPr lang="en-US" dirty="0"/>
+              <a:t>&lt;</a:t>
+            </a:r>
+            <a:r>
+              <a:rPr lang="en-US" dirty="0" err="1"/>
+              <a:t>hr</a:t>
+            </a:r>
+            <a:r>
+              <a:rPr lang="en-US" dirty="0"/>
+              <a:t>&gt;</a:t>
+            </a:r>
+            <a:br>
+              <a:rPr lang="en-US" dirty="0"/>
+            </a:br>
+            <a:endParaRPr lang="en-US" dirty="0"/>
+          </a:p>
+        </p:txBody>
+      </p:sp>
+    </p:spTree>
+    <p:extLst>
+      <p:ext uri="{BB962C8B-B14F-4D97-AF65-F5344CB8AC3E}">
+        <p14:creationId xmlns:p14="http://schemas.microsoft.com/office/powerpoint/2010/main" val="4260907034"/>
+      </p:ext>
+    </p:extLst>
+  </p:cSld>
+  <p:clrMapOvr>
+    <a:masterClrMapping/>
+  </p:clrMapOvr>
+</p:sld>
+</file>
+
+<file path=ppt/slides/slide7.xml><?xml version="1.0" encoding="utf-8"?>
+<p:sld xmlns:a="http://schemas.openxmlformats.org/drawingml/2006/main" xmlns:r="http://schemas.openxmlformats.org/officeDocument/2006/relationships" xmlns:p="http://schemas.openxmlformats.org/presentationml/2006/main">
+  <p:cSld>
+    <p:spTree>
+      <p:nvGrpSpPr>
+        <p:cNvPr id="1" name=""/>
+        <p:cNvGrpSpPr/>
+        <p:nvPr/>
+      </p:nvGrpSpPr>
+      <p:grpSpPr>
+        <a:xfrm>
+          <a:off x="0" y="0"/>
+          <a:ext cx="0" cy="0"/>
+          <a:chOff x="0" y="0"/>
+          <a:chExt cx="0" cy="0"/>
+        </a:xfrm>
+      </p:grpSpPr>
+      <p:sp>
+        <p:nvSpPr>
+          <p:cNvPr id="2" name="Title 1">
+            <a:extLst>
+              <a:ext uri="{FF2B5EF4-FFF2-40B4-BE49-F238E27FC236}">
+                <a16:creationId xmlns:a16="http://schemas.microsoft.com/office/drawing/2014/main" id="{A350DE75-87D9-4E93-BCE2-820418C202D2}"/>
+              </a:ext>
+            </a:extLst>
+          </p:cNvPr>
+          <p:cNvSpPr>
+            <a:spLocks noGrp="1"/>
+          </p:cNvSpPr>
+          <p:nvPr>
+            <p:ph type="title"/>
+          </p:nvPr>
+        </p:nvSpPr>
+        <p:spPr/>
+        <p:txBody>
+          <a:bodyPr/>
+          <a:lstStyle/>
+          <a:p>
+            <a:r>
+              <a:rPr lang="en-US" dirty="0"/>
+              <a:t>HTML COMMENTS</a:t>
+            </a:r>
+          </a:p>
+        </p:txBody>
+      </p:sp>
+      <p:sp>
+        <p:nvSpPr>
+          <p:cNvPr id="3" name="Content Placeholder 2">
+            <a:extLst>
+              <a:ext uri="{FF2B5EF4-FFF2-40B4-BE49-F238E27FC236}">
+                <a16:creationId xmlns:a16="http://schemas.microsoft.com/office/drawing/2014/main" id="{571EDD66-6BB9-447F-931C-0495AA530F33}"/>
+              </a:ext>
+            </a:extLst>
+          </p:cNvPr>
+          <p:cNvSpPr>
+            <a:spLocks noGrp="1"/>
+          </p:cNvSpPr>
+          <p:nvPr>
+            <p:ph idx="1"/>
+          </p:nvPr>
+        </p:nvSpPr>
+        <p:spPr/>
+        <p:txBody>
+          <a:bodyPr/>
+          <a:lstStyle/>
+          <a:p>
+            <a:r>
+              <a:rPr lang="en-US" dirty="0"/>
+              <a:t>&lt;!-- This is a comment --&gt;</a:t>
+            </a:r>
+          </a:p>
+          <a:p>
+            <a:endParaRPr lang="en-US" dirty="0"/>
+          </a:p>
+        </p:txBody>
+      </p:sp>
+    </p:spTree>
+    <p:extLst>
+      <p:ext uri="{BB962C8B-B14F-4D97-AF65-F5344CB8AC3E}">
+        <p14:creationId xmlns:p14="http://schemas.microsoft.com/office/powerpoint/2010/main" val="60517198"/>
+      </p:ext>
+    </p:extLst>
+  </p:cSld>
+  <p:clrMapOvr>
+    <a:masterClrMapping/>
+  </p:clrMapOvr>
+</p:sld>
+</file>
+
+<file path=ppt/slides/slide8.xml><?xml version="1.0" encoding="utf-8"?>
+<p:sld xmlns:a="http://schemas.openxmlformats.org/drawingml/2006/main" xmlns:r="http://schemas.openxmlformats.org/officeDocument/2006/relationships" xmlns:p="http://schemas.openxmlformats.org/presentationml/2006/main">
+  <p:cSld>
+    <p:spTree>
+      <p:nvGrpSpPr>
+        <p:cNvPr id="1" name=""/>
+        <p:cNvGrpSpPr/>
+        <p:nvPr/>
+      </p:nvGrpSpPr>
+      <p:grpSpPr>
+        <a:xfrm>
+          <a:off x="0" y="0"/>
+          <a:ext cx="0" cy="0"/>
+          <a:chOff x="0" y="0"/>
+          <a:chExt cx="0" cy="0"/>
+        </a:xfrm>
+      </p:grpSpPr>
+      <p:sp>
+        <p:nvSpPr>
+          <p:cNvPr id="2" name="Title 1">
+            <a:extLst>
+              <a:ext uri="{FF2B5EF4-FFF2-40B4-BE49-F238E27FC236}">
+                <a16:creationId xmlns:a16="http://schemas.microsoft.com/office/drawing/2014/main" id="{AA2BF461-8243-4C03-8586-6D31ECCD3D67}"/>
+              </a:ext>
+            </a:extLst>
+          </p:cNvPr>
+          <p:cNvSpPr>
+            <a:spLocks noGrp="1"/>
+          </p:cNvSpPr>
+          <p:nvPr>
+            <p:ph type="title"/>
+          </p:nvPr>
+        </p:nvSpPr>
+        <p:spPr/>
+        <p:txBody>
+          <a:bodyPr/>
+          <a:lstStyle/>
+          <a:p>
+            <a:r>
+              <a:rPr lang="en-US" dirty="0"/>
+              <a:t>Resources</a:t>
+            </a:r>
+          </a:p>
+        </p:txBody>
+      </p:sp>
+      <p:sp>
+        <p:nvSpPr>
+          <p:cNvPr id="3" name="Content Placeholder 2">
+            <a:extLst>
+              <a:ext uri="{FF2B5EF4-FFF2-40B4-BE49-F238E27FC236}">
+                <a16:creationId xmlns:a16="http://schemas.microsoft.com/office/drawing/2014/main" id="{4F249AF4-BEFC-4022-B420-5C50CDA13C5A}"/>
+              </a:ext>
+            </a:extLst>
+          </p:cNvPr>
+          <p:cNvSpPr>
+            <a:spLocks noGrp="1"/>
+          </p:cNvSpPr>
+          <p:nvPr>
+            <p:ph idx="1"/>
+          </p:nvPr>
+        </p:nvSpPr>
+        <p:spPr/>
+        <p:txBody>
+          <a:bodyPr/>
+          <a:lstStyle/>
+          <a:p>
+            <a:r>
+              <a:rPr lang="en-US" dirty="0"/>
+              <a:t>www.tizag.com</a:t>
+            </a:r>
+          </a:p>
+          <a:p>
+            <a:r>
+              <a:rPr lang="en-US" u="sng" dirty="0">
+                <a:hlinkClick r:id="rId2"/>
+              </a:rPr>
+              <a:t>https://www.youtube.com/watch?v=wrdR5Su_Stg</a:t>
+            </a:r>
+            <a:endParaRPr lang="en-US" u="sng" dirty="0"/>
+          </a:p>
+          <a:p>
+            <a:r>
+              <a:rPr lang="en-US" dirty="0">
+                <a:hlinkClick r:id="rId3"/>
+              </a:rPr>
+              <a:t>https://www.w3schools.com/html/default.asp</a:t>
+            </a:r>
+            <a:endParaRPr lang="en-US" dirty="0"/>
+          </a:p>
+          <a:p>
+            <a:endParaRPr lang="en-US" dirty="0"/>
+          </a:p>
+        </p:txBody>
+      </p:sp>
+    </p:spTree>
+    <p:extLst>
+      <p:ext uri="{BB962C8B-B14F-4D97-AF65-F5344CB8AC3E}">
+        <p14:creationId xmlns:p14="http://schemas.microsoft.com/office/powerpoint/2010/main" val="4045771360"/>
+      </p:ext>
+    </p:extLst>
+  </p:cSld>
+  <p:clrMapOvr>
+    <a:masterClrMapping/>
+  </p:clrMapOvr>
+</p:sld>
+</file>
+
 <file path=ppt/theme/theme1.xml><?xml version="1.0" encoding="utf-8"?>
-<a:theme xmlns:a="http://schemas.openxmlformats.org/drawingml/2006/main" name="Office Theme">
+<a:theme xmlns:a="http://schemas.openxmlformats.org/drawingml/2006/main" name="View">
   <a:themeElements>
-    <a:clrScheme name="Office">
+    <a:clrScheme name="Blue Warm">
       <a:dk1>
         <a:sysClr val="windowText" lastClr="000000"/>
       </a:dk1>
@@ -4273,100 +4818,48 @@
         <a:sysClr val="window" lastClr="FFFFFF"/>
       </a:lt1>
       <a:dk2>
-        <a:srgbClr val="44546A"/>
+        <a:srgbClr val="242852"/>
       </a:dk2>
       <a:lt2>
-        <a:srgbClr val="E7E6E6"/>
+        <a:srgbClr val="ACCBF9"/>
       </a:lt2>
       <a:accent1>
-        <a:srgbClr val="4472C4"/>
+        <a:srgbClr val="4A66AC"/>
       </a:accent1>
       <a:accent2>
-        <a:srgbClr val="ED7D31"/>
+        <a:srgbClr val="629DD1"/>
       </a:accent2>
       <a:accent3>
-        <a:srgbClr val="A5A5A5"/>
+        <a:srgbClr val="297FD5"/>
       </a:accent3>
       <a:accent4>
-        <a:srgbClr val="FFC000"/>
+        <a:srgbClr val="7F8FA9"/>
       </a:accent4>
       <a:accent5>
-        <a:srgbClr val="5B9BD5"/>
+        <a:srgbClr val="5AA2AE"/>
       </a:accent5>
       <a:accent6>
-        <a:srgbClr val="70AD47"/>
+        <a:srgbClr val="9D90A0"/>
       </a:accent6>
       <a:hlink>
-        <a:srgbClr val="0563C1"/>
+        <a:srgbClr val="9454C3"/>
       </a:hlink>
       <a:folHlink>
-        <a:srgbClr val="954F72"/>
+        <a:srgbClr val="3EBBF0"/>
       </a:folHlink>
     </a:clrScheme>
-    <a:fontScheme name="Office">
+    <a:fontScheme name="View">
       <a:majorFont>
-        <a:latin typeface="Calibri Light" panose="020F0302020204030204"/>
+        <a:latin typeface="Century Schoolbook" panose="02040604050505020304"/>
         <a:ea typeface=""/>
         <a:cs typeface=""/>
-        <a:font script="Jpan" typeface="游ゴシック Light"/>
+        <a:font script="Jpan" typeface="ＭＳ ゴシック"/>
         <a:font script="Hang" typeface="맑은 고딕"/>
-        <a:font script="Hans" typeface="等线 Light"/>
+        <a:font script="Hans" typeface="宋体"/>
         <a:font script="Hant" typeface="新細明體"/>
-        <a:font script="Arab" typeface="Times New Roman"/>
-        <a:font script="Hebr" typeface="Times New Roman"/>
-        <a:font script="Thai" typeface="Angsana New"/>
-        <a:font script="Ethi" typeface="Nyala"/>
-        <a:font script="Beng" typeface="Vrinda"/>
-        <a:font script="Gujr" typeface="Shruti"/>
-        <a:font script="Khmr" typeface="MoolBoran"/>
-        <a:font script="Knda" typeface="Tunga"/>
-        <a:font script="Guru" typeface="Raavi"/>
-        <a:font script="Cans" typeface="Euphemia"/>
-        <a:font script="Cher" typeface="Plantagenet Cherokee"/>
-        <a:font script="Yiii" typeface="Microsoft Yi Baiti"/>
-        <a:font script="Tibt" typeface="Microsoft Himalaya"/>
-        <a:font script="Thaa" typeface="MV Boli"/>
-        <a:font script="Deva" typeface="Mangal"/>
-        <a:font script="Telu" typeface="Gautami"/>
-        <a:font script="Taml" typeface="Latha"/>
-        <a:font script="Syrc" typeface="Estrangelo Edessa"/>
-        <a:font script="Orya" typeface="Kalinga"/>
-        <a:font script="Mlym" typeface="Kartika"/>
-        <a:font script="Laoo" typeface="DokChampa"/>
-        <a:font script="Sinh" typeface="Iskoola Pota"/>
-        <a:font script="Mong" typeface="Mongolian Baiti"/>
-        <a:font script="Viet" typeface="Times New Roman"/>
-        <a:font script="Uigh" typeface="Microsoft Uighur"/>
-        <a:font script="Geor" typeface="Sylfaen"/>
-        <a:font script="Armn" typeface="Arial"/>
-        <a:font script="Bugi" typeface="Leelawadee UI"/>
-        <a:font script="Bopo" typeface="Microsoft JhengHei"/>
-        <a:font script="Java" typeface="Javanese Text"/>
-        <a:font script="Lisu" typeface="Segoe UI"/>
-        <a:font script="Mymr" typeface="Myanmar Text"/>
-        <a:font script="Nkoo" typeface="Ebrima"/>
-        <a:font script="Olck" typeface="Nirmala UI"/>
-        <a:font script="Osma" typeface="Ebrima"/>
-        <a:font script="Phag" typeface="Phagspa"/>
-        <a:font script="Syrn" typeface="Estrangelo Edessa"/>
-        <a:font script="Syrj" typeface="Estrangelo Edessa"/>
-        <a:font script="Syre" typeface="Estrangelo Edessa"/>
-        <a:font script="Sora" typeface="Nirmala UI"/>
-        <a:font script="Tale" typeface="Microsoft Tai Le"/>
-        <a:font script="Talu" typeface="Microsoft New Tai Lue"/>
-        <a:font script="Tfng" typeface="Ebrima"/>
-      </a:majorFont>
-      <a:minorFont>
-        <a:latin typeface="Calibri" panose="020F0502020204030204"/>
-        <a:ea typeface=""/>
-        <a:cs typeface=""/>
-        <a:font script="Jpan" typeface="游ゴシック"/>
-        <a:font script="Hang" typeface="맑은 고딕"/>
-        <a:font script="Hans" typeface="等线"/>
-        <a:font script="Hant" typeface="新細明體"/>
-        <a:font script="Arab" typeface="Arial"/>
-        <a:font script="Hebr" typeface="Arial"/>
-        <a:font script="Thai" typeface="Cordia New"/>
+        <a:font script="Arab" typeface="Tahoma"/>
+        <a:font script="Hebr" typeface="Gisha"/>
+        <a:font script="Thai" typeface="DilleniaUPC"/>
         <a:font script="Ethi" typeface="Nyala"/>
         <a:font script="Beng" typeface="Vrinda"/>
         <a:font script="Gujr" typeface="Shruti"/>
@@ -4387,107 +4880,86 @@
         <a:font script="Laoo" typeface="DokChampa"/>
         <a:font script="Sinh" typeface="Iskoola Pota"/>
         <a:font script="Mong" typeface="Mongolian Baiti"/>
-        <a:font script="Viet" typeface="Arial"/>
+        <a:font script="Viet" typeface="Tahoma"/>
         <a:font script="Uigh" typeface="Microsoft Uighur"/>
         <a:font script="Geor" typeface="Sylfaen"/>
-        <a:font script="Armn" typeface="Arial"/>
-        <a:font script="Bugi" typeface="Leelawadee UI"/>
-        <a:font script="Bopo" typeface="Microsoft JhengHei"/>
-        <a:font script="Java" typeface="Javanese Text"/>
-        <a:font script="Lisu" typeface="Segoe UI"/>
-        <a:font script="Mymr" typeface="Myanmar Text"/>
-        <a:font script="Nkoo" typeface="Ebrima"/>
-        <a:font script="Olck" typeface="Nirmala UI"/>
-        <a:font script="Osma" typeface="Ebrima"/>
-        <a:font script="Phag" typeface="Phagspa"/>
-        <a:font script="Syrn" typeface="Estrangelo Edessa"/>
-        <a:font script="Syrj" typeface="Estrangelo Edessa"/>
-        <a:font script="Syre" typeface="Estrangelo Edessa"/>
-        <a:font script="Sora" typeface="Nirmala UI"/>
-        <a:font script="Tale" typeface="Microsoft Tai Le"/>
-        <a:font script="Talu" typeface="Microsoft New Tai Lue"/>
-        <a:font script="Tfng" typeface="Ebrima"/>
+      </a:majorFont>
+      <a:minorFont>
+        <a:latin typeface="Century Schoolbook" panose="02040604050505020304"/>
+        <a:ea typeface=""/>
+        <a:cs typeface=""/>
+        <a:font script="Jpan" typeface="ＭＳ ゴシック"/>
+        <a:font script="Hang" typeface="맑은 고딕"/>
+        <a:font script="Hans" typeface="宋体"/>
+        <a:font script="Hant" typeface="新細明體"/>
+        <a:font script="Arab" typeface="Tahoma"/>
+        <a:font script="Hebr" typeface="Gisha"/>
+        <a:font script="Thai" typeface="DilleniaUPC"/>
+        <a:font script="Ethi" typeface="Nyala"/>
+        <a:font script="Beng" typeface="Vrinda"/>
+        <a:font script="Gujr" typeface="Shruti"/>
+        <a:font script="Khmr" typeface="DaunPenh"/>
+        <a:font script="Knda" typeface="Tunga"/>
+        <a:font script="Guru" typeface="Raavi"/>
+        <a:font script="Cans" typeface="Euphemia"/>
+        <a:font script="Cher" typeface="Plantagenet Cherokee"/>
+        <a:font script="Yiii" typeface="Microsoft Yi Baiti"/>
+        <a:font script="Tibt" typeface="Microsoft Himalaya"/>
+        <a:font script="Thaa" typeface="MV Boli"/>
+        <a:font script="Deva" typeface="Mangal"/>
+        <a:font script="Telu" typeface="Gautami"/>
+        <a:font script="Taml" typeface="Latha"/>
+        <a:font script="Syrc" typeface="Estrangelo Edessa"/>
+        <a:font script="Orya" typeface="Kalinga"/>
+        <a:font script="Mlym" typeface="Kartika"/>
+        <a:font script="Laoo" typeface="DokChampa"/>
+        <a:font script="Sinh" typeface="Iskoola Pota"/>
+        <a:font script="Mong" typeface="Mongolian Baiti"/>
+        <a:font script="Viet" typeface="Verdana"/>
+        <a:font script="Uigh" typeface="Microsoft Uighur"/>
+        <a:font script="Geor" typeface="Sylfaen"/>
       </a:minorFont>
     </a:fontScheme>
-    <a:fmtScheme name="Office">
+    <a:fmtScheme name="View">
       <a:fillStyleLst>
         <a:solidFill>
           <a:schemeClr val="phClr"/>
         </a:solidFill>
-        <a:gradFill rotWithShape="1">
-          <a:gsLst>
-            <a:gs pos="0">
-              <a:schemeClr val="phClr">
-                <a:lumMod val="110000"/>
-                <a:satMod val="105000"/>
-                <a:tint val="67000"/>
-              </a:schemeClr>
-            </a:gs>
-            <a:gs pos="50000">
-              <a:schemeClr val="phClr">
-                <a:lumMod val="105000"/>
-                <a:satMod val="103000"/>
-                <a:tint val="73000"/>
-              </a:schemeClr>
-            </a:gs>
-            <a:gs pos="100000">
-              <a:schemeClr val="phClr">
-                <a:lumMod val="105000"/>
-                <a:satMod val="109000"/>
-                <a:tint val="81000"/>
-              </a:schemeClr>
-            </a:gs>
-          </a:gsLst>
-          <a:lin ang="5400000" scaled="0"/>
-        </a:gradFill>
-        <a:gradFill rotWithShape="1">
-          <a:gsLst>
-            <a:gs pos="0">
-              <a:schemeClr val="phClr">
-                <a:satMod val="103000"/>
-                <a:lumMod val="102000"/>
-                <a:tint val="94000"/>
-              </a:schemeClr>
-            </a:gs>
-            <a:gs pos="50000">
-              <a:schemeClr val="phClr">
-                <a:satMod val="110000"/>
-                <a:lumMod val="100000"/>
-                <a:shade val="100000"/>
-              </a:schemeClr>
-            </a:gs>
-            <a:gs pos="100000">
-              <a:schemeClr val="phClr">
-                <a:lumMod val="99000"/>
-                <a:satMod val="120000"/>
-                <a:shade val="78000"/>
-              </a:schemeClr>
-            </a:gs>
-          </a:gsLst>
-          <a:lin ang="5400000" scaled="0"/>
-        </a:gradFill>
+        <a:solidFill>
+          <a:schemeClr val="phClr">
+            <a:tint val="60000"/>
+            <a:satMod val="120000"/>
+          </a:schemeClr>
+        </a:solidFill>
+        <a:solidFill>
+          <a:schemeClr val="phClr">
+            <a:shade val="75000"/>
+            <a:satMod val="160000"/>
+          </a:schemeClr>
+        </a:solidFill>
       </a:fillStyleLst>
       <a:lnStyleLst>
-        <a:ln w="6350" cap="flat" cmpd="sng" algn="ctr">
+        <a:ln w="9525" cap="flat" cmpd="sng" algn="ctr">
           <a:solidFill>
             <a:schemeClr val="phClr"/>
           </a:solidFill>
           <a:prstDash val="solid"/>
-          <a:miter lim="800000"/>
         </a:ln>
-        <a:ln w="12700" cap="flat" cmpd="sng" algn="ctr">
+        <a:ln w="13970" cap="flat" cmpd="sng" algn="ctr">
           <a:solidFill>
             <a:schemeClr val="phClr"/>
           </a:solidFill>
           <a:prstDash val="solid"/>
-          <a:miter lim="800000"/>
         </a:ln>
-        <a:ln w="19050" cap="flat" cmpd="sng" algn="ctr">
+        <a:ln w="17145" cap="flat" cmpd="sng" algn="ctr">
           <a:solidFill>
-            <a:schemeClr val="phClr"/>
+            <a:schemeClr val="phClr">
+              <a:shade val="95000"/>
+              <a:alpha val="95000"/>
+              <a:satMod val="150000"/>
+            </a:schemeClr>
           </a:solidFill>
           <a:prstDash val="solid"/>
-          <a:miter lim="800000"/>
         </a:ln>
       </a:lnStyleLst>
       <a:effectStyleLst>
@@ -4495,16 +4967,52 @@
           <a:effectLst/>
         </a:effectStyle>
         <a:effectStyle>
-          <a:effectLst/>
+          <a:effectLst>
+            <a:outerShdw blurRad="50800" dist="15240" dir="5400000" algn="tl" rotWithShape="0">
+              <a:srgbClr val="000000">
+                <a:alpha val="75000"/>
+              </a:srgbClr>
+            </a:outerShdw>
+          </a:effectLst>
+          <a:scene3d>
+            <a:camera prst="orthographicFront">
+              <a:rot lat="0" lon="0" rev="0"/>
+            </a:camera>
+            <a:lightRig rig="brightRoom" dir="tl"/>
+          </a:scene3d>
+          <a:sp3d contourW="9525" prstMaterial="flat">
+            <a:bevelT w="0" h="0" prst="coolSlant"/>
+            <a:contourClr>
+              <a:schemeClr val="phClr">
+                <a:shade val="35000"/>
+                <a:satMod val="130000"/>
+              </a:schemeClr>
+            </a:contourClr>
+          </a:sp3d>
         </a:effectStyle>
         <a:effectStyle>
           <a:effectLst>
-            <a:outerShdw blurRad="57150" dist="19050" dir="5400000" algn="ctr" rotWithShape="0">
+            <a:outerShdw blurRad="76200" dist="25400" dir="5400000" algn="tl" rotWithShape="0">
               <a:srgbClr val="000000">
-                <a:alpha val="63000"/>
+                <a:alpha val="55000"/>
               </a:srgbClr>
             </a:outerShdw>
           </a:effectLst>
+          <a:scene3d>
+            <a:camera prst="orthographicFront">
+              <a:rot lat="0" lon="0" rev="0"/>
+            </a:camera>
+            <a:lightRig rig="brightRoom" dir="tl"/>
+          </a:scene3d>
+          <a:sp3d contourW="19050" prstMaterial="flat">
+            <a:bevelT w="0" h="0" prst="coolSlant"/>
+            <a:contourClr>
+              <a:schemeClr val="phClr">
+                <a:shade val="25000"/>
+                <a:satMod val="140000"/>
+              </a:schemeClr>
+            </a:contourClr>
+          </a:sp3d>
         </a:effectStyle>
       </a:effectStyleLst>
       <a:bgFillStyleLst>
@@ -4521,28 +5029,23 @@
           <a:gsLst>
             <a:gs pos="0">
               <a:schemeClr val="phClr">
-                <a:tint val="93000"/>
-                <a:satMod val="150000"/>
+                <a:tint val="94000"/>
                 <a:shade val="98000"/>
+                <a:satMod val="130000"/>
                 <a:lumMod val="102000"/>
-              </a:schemeClr>
-            </a:gs>
-            <a:gs pos="50000">
-              <a:schemeClr val="phClr">
-                <a:tint val="98000"/>
-                <a:satMod val="130000"/>
-                <a:shade val="90000"/>
-                <a:lumMod val="103000"/>
               </a:schemeClr>
             </a:gs>
             <a:gs pos="100000">
               <a:schemeClr val="phClr">
-                <a:shade val="63000"/>
-                <a:satMod val="120000"/>
+                <a:tint val="98000"/>
+                <a:shade val="78000"/>
+                <a:satMod val="140000"/>
               </a:schemeClr>
             </a:gs>
           </a:gsLst>
-          <a:lin ang="5400000" scaled="0"/>
+          <a:path path="circle">
+            <a:fillToRect l="100000" t="100000" r="100000" b="100000"/>
+          </a:path>
         </a:gradFill>
       </a:bgFillStyleLst>
     </a:fmtScheme>
@@ -4551,7 +5054,7 @@
   <a:extraClrSchemeLst/>
   <a:extLst>
     <a:ext uri="{05A4C25C-085E-4340-85A3-A5531E510DB2}">
-      <thm15:themeFamily xmlns:thm15="http://schemas.microsoft.com/office/thememl/2012/main" name="Office Theme" id="{62F939B6-93AF-4DB8-9C6B-D6C7DFDC589F}" vid="{4A3C46E8-61CC-4603-A589-7422A47A8E4A}"/>
+      <thm15:themeFamily xmlns:thm15="http://schemas.microsoft.com/office/thememl/2012/main" name="View" id="{BA0EB5A6-F2D4-4F82-977B-64ADEE4A2A69}" vid="{3969A8A2-35DB-4E3B-8885-16FD20568674}"/>
     </a:ext>
   </a:extLst>
 </a:theme>

</xml_diff>